<commit_message>
intro to smoke data
</commit_message>
<xml_diff>
--- a/results/2017-09-22_Correspondence-analysis-for-nursing-unit-similarity.pptx
+++ b/results/2017-09-22_Correspondence-analysis-for-nursing-unit-similarity.pptx
@@ -4,6 +4,9 @@
   <p:sldMasterIdLst>
     <p:sldMasterId id="2147483660" r:id="rId1"/>
   </p:sldMasterIdLst>
+  <p:notesMasterIdLst>
+    <p:notesMasterId r:id="rId22"/>
+  </p:notesMasterIdLst>
   <p:sldIdLst>
     <p:sldId id="257" r:id="rId2"/>
     <p:sldId id="259" r:id="rId3"/>
@@ -124,6 +127,462 @@
     </a:lvl9pPr>
   </p:defaultTextStyle>
 </p:presentation>
+</file>
+
+<file path=ppt/notesMasters/notesMaster1.xml><?xml version="1.0" encoding="utf-8"?>
+<p:notesMaster xmlns:a="http://schemas.openxmlformats.org/drawingml/2006/main" xmlns:r="http://schemas.openxmlformats.org/officeDocument/2006/relationships" xmlns:p="http://schemas.openxmlformats.org/presentationml/2006/main">
+  <p:cSld>
+    <p:bg>
+      <p:bgRef idx="1001">
+        <a:schemeClr val="bg1"/>
+      </p:bgRef>
+    </p:bg>
+    <p:spTree>
+      <p:nvGrpSpPr>
+        <p:cNvPr id="1" name=""/>
+        <p:cNvGrpSpPr/>
+        <p:nvPr/>
+      </p:nvGrpSpPr>
+      <p:grpSpPr>
+        <a:xfrm>
+          <a:off x="0" y="0"/>
+          <a:ext cx="0" cy="0"/>
+          <a:chOff x="0" y="0"/>
+          <a:chExt cx="0" cy="0"/>
+        </a:xfrm>
+      </p:grpSpPr>
+      <p:sp>
+        <p:nvSpPr>
+          <p:cNvPr id="2" name="Header Placeholder 1"/>
+          <p:cNvSpPr>
+            <a:spLocks noGrp="1"/>
+          </p:cNvSpPr>
+          <p:nvPr>
+            <p:ph type="hdr" sz="quarter"/>
+          </p:nvPr>
+        </p:nvSpPr>
+        <p:spPr>
+          <a:xfrm>
+            <a:off x="0" y="0"/>
+            <a:ext cx="2971800" cy="457200"/>
+          </a:xfrm>
+          <a:prstGeom prst="rect">
+            <a:avLst/>
+          </a:prstGeom>
+        </p:spPr>
+        <p:txBody>
+          <a:bodyPr vert="horz" lIns="91440" tIns="45720" rIns="91440" bIns="45720" rtlCol="0"/>
+          <a:lstStyle>
+            <a:lvl1pPr algn="l">
+              <a:defRPr sz="1200"/>
+            </a:lvl1pPr>
+          </a:lstStyle>
+          <a:p>
+            <a:endParaRPr lang="en-CA"/>
+          </a:p>
+        </p:txBody>
+      </p:sp>
+      <p:sp>
+        <p:nvSpPr>
+          <p:cNvPr id="3" name="Date Placeholder 2"/>
+          <p:cNvSpPr>
+            <a:spLocks noGrp="1"/>
+          </p:cNvSpPr>
+          <p:nvPr>
+            <p:ph type="dt" idx="1"/>
+          </p:nvPr>
+        </p:nvSpPr>
+        <p:spPr>
+          <a:xfrm>
+            <a:off x="3884613" y="0"/>
+            <a:ext cx="2971800" cy="457200"/>
+          </a:xfrm>
+          <a:prstGeom prst="rect">
+            <a:avLst/>
+          </a:prstGeom>
+        </p:spPr>
+        <p:txBody>
+          <a:bodyPr vert="horz" lIns="91440" tIns="45720" rIns="91440" bIns="45720" rtlCol="0"/>
+          <a:lstStyle>
+            <a:lvl1pPr algn="r">
+              <a:defRPr sz="1200"/>
+            </a:lvl1pPr>
+          </a:lstStyle>
+          <a:p>
+            <a:fld id="{DADCAE3F-3E54-45D0-B907-87242655F364}" type="datetimeFigureOut">
+              <a:rPr lang="en-CA" smtClean="0"/>
+              <a:t>9/22/2017</a:t>
+            </a:fld>
+            <a:endParaRPr lang="en-CA"/>
+          </a:p>
+        </p:txBody>
+      </p:sp>
+      <p:sp>
+        <p:nvSpPr>
+          <p:cNvPr id="4" name="Slide Image Placeholder 3"/>
+          <p:cNvSpPr>
+            <a:spLocks noGrp="1" noRot="1" noChangeAspect="1"/>
+          </p:cNvSpPr>
+          <p:nvPr>
+            <p:ph type="sldImg" idx="2"/>
+          </p:nvPr>
+        </p:nvSpPr>
+        <p:spPr>
+          <a:xfrm>
+            <a:off x="1143000" y="685800"/>
+            <a:ext cx="4572000" cy="3429000"/>
+          </a:xfrm>
+          <a:prstGeom prst="rect">
+            <a:avLst/>
+          </a:prstGeom>
+          <a:noFill/>
+          <a:ln w="12700">
+            <a:solidFill>
+              <a:prstClr val="black"/>
+            </a:solidFill>
+          </a:ln>
+        </p:spPr>
+        <p:txBody>
+          <a:bodyPr vert="horz" lIns="91440" tIns="45720" rIns="91440" bIns="45720" rtlCol="0" anchor="ctr"/>
+          <a:lstStyle/>
+          <a:p>
+            <a:endParaRPr lang="en-CA"/>
+          </a:p>
+        </p:txBody>
+      </p:sp>
+      <p:sp>
+        <p:nvSpPr>
+          <p:cNvPr id="5" name="Notes Placeholder 4"/>
+          <p:cNvSpPr>
+            <a:spLocks noGrp="1"/>
+          </p:cNvSpPr>
+          <p:nvPr>
+            <p:ph type="body" sz="quarter" idx="3"/>
+          </p:nvPr>
+        </p:nvSpPr>
+        <p:spPr>
+          <a:xfrm>
+            <a:off x="685800" y="4343400"/>
+            <a:ext cx="5486400" cy="4114800"/>
+          </a:xfrm>
+          <a:prstGeom prst="rect">
+            <a:avLst/>
+          </a:prstGeom>
+        </p:spPr>
+        <p:txBody>
+          <a:bodyPr vert="horz" lIns="91440" tIns="45720" rIns="91440" bIns="45720" rtlCol="0"/>
+          <a:lstStyle/>
+          <a:p>
+            <a:pPr lvl="0"/>
+            <a:r>
+              <a:rPr lang="en-US" smtClean="0"/>
+              <a:t>Click to edit Master text styles</a:t>
+            </a:r>
+          </a:p>
+          <a:p>
+            <a:pPr lvl="1"/>
+            <a:r>
+              <a:rPr lang="en-US" smtClean="0"/>
+              <a:t>Second level</a:t>
+            </a:r>
+          </a:p>
+          <a:p>
+            <a:pPr lvl="2"/>
+            <a:r>
+              <a:rPr lang="en-US" smtClean="0"/>
+              <a:t>Third level</a:t>
+            </a:r>
+          </a:p>
+          <a:p>
+            <a:pPr lvl="3"/>
+            <a:r>
+              <a:rPr lang="en-US" smtClean="0"/>
+              <a:t>Fourth level</a:t>
+            </a:r>
+          </a:p>
+          <a:p>
+            <a:pPr lvl="4"/>
+            <a:r>
+              <a:rPr lang="en-US" smtClean="0"/>
+              <a:t>Fifth level</a:t>
+            </a:r>
+            <a:endParaRPr lang="en-CA"/>
+          </a:p>
+        </p:txBody>
+      </p:sp>
+      <p:sp>
+        <p:nvSpPr>
+          <p:cNvPr id="6" name="Footer Placeholder 5"/>
+          <p:cNvSpPr>
+            <a:spLocks noGrp="1"/>
+          </p:cNvSpPr>
+          <p:nvPr>
+            <p:ph type="ftr" sz="quarter" idx="4"/>
+          </p:nvPr>
+        </p:nvSpPr>
+        <p:spPr>
+          <a:xfrm>
+            <a:off x="0" y="8685213"/>
+            <a:ext cx="2971800" cy="457200"/>
+          </a:xfrm>
+          <a:prstGeom prst="rect">
+            <a:avLst/>
+          </a:prstGeom>
+        </p:spPr>
+        <p:txBody>
+          <a:bodyPr vert="horz" lIns="91440" tIns="45720" rIns="91440" bIns="45720" rtlCol="0" anchor="b"/>
+          <a:lstStyle>
+            <a:lvl1pPr algn="l">
+              <a:defRPr sz="1200"/>
+            </a:lvl1pPr>
+          </a:lstStyle>
+          <a:p>
+            <a:endParaRPr lang="en-CA"/>
+          </a:p>
+        </p:txBody>
+      </p:sp>
+      <p:sp>
+        <p:nvSpPr>
+          <p:cNvPr id="7" name="Slide Number Placeholder 6"/>
+          <p:cNvSpPr>
+            <a:spLocks noGrp="1"/>
+          </p:cNvSpPr>
+          <p:nvPr>
+            <p:ph type="sldNum" sz="quarter" idx="5"/>
+          </p:nvPr>
+        </p:nvSpPr>
+        <p:spPr>
+          <a:xfrm>
+            <a:off x="3884613" y="8685213"/>
+            <a:ext cx="2971800" cy="457200"/>
+          </a:xfrm>
+          <a:prstGeom prst="rect">
+            <a:avLst/>
+          </a:prstGeom>
+        </p:spPr>
+        <p:txBody>
+          <a:bodyPr vert="horz" lIns="91440" tIns="45720" rIns="91440" bIns="45720" rtlCol="0" anchor="b"/>
+          <a:lstStyle>
+            <a:lvl1pPr algn="r">
+              <a:defRPr sz="1200"/>
+            </a:lvl1pPr>
+          </a:lstStyle>
+          <a:p>
+            <a:fld id="{724C6C8E-524E-4E9A-9370-4C652C275164}" type="slidenum">
+              <a:rPr lang="en-CA" smtClean="0"/>
+              <a:t>‹#›</a:t>
+            </a:fld>
+            <a:endParaRPr lang="en-CA"/>
+          </a:p>
+        </p:txBody>
+      </p:sp>
+    </p:spTree>
+    <p:extLst>
+      <p:ext uri="{BB962C8B-B14F-4D97-AF65-F5344CB8AC3E}">
+        <p14:creationId xmlns:p14="http://schemas.microsoft.com/office/powerpoint/2010/main" val="2415251591"/>
+      </p:ext>
+    </p:extLst>
+  </p:cSld>
+  <p:clrMap bg1="lt1" tx1="dk1" bg2="lt2" tx2="dk2" accent1="accent1" accent2="accent2" accent3="accent3" accent4="accent4" accent5="accent5" accent6="accent6" hlink="hlink" folHlink="folHlink"/>
+  <p:notesStyle>
+    <a:lvl1pPr marL="0" algn="l" defTabSz="914400" rtl="0" eaLnBrk="1" latinLnBrk="0" hangingPunct="1">
+      <a:defRPr sz="1200" kern="1200">
+        <a:solidFill>
+          <a:schemeClr val="tx1"/>
+        </a:solidFill>
+        <a:latin typeface="+mn-lt"/>
+        <a:ea typeface="+mn-ea"/>
+        <a:cs typeface="+mn-cs"/>
+      </a:defRPr>
+    </a:lvl1pPr>
+    <a:lvl2pPr marL="457200" algn="l" defTabSz="914400" rtl="0" eaLnBrk="1" latinLnBrk="0" hangingPunct="1">
+      <a:defRPr sz="1200" kern="1200">
+        <a:solidFill>
+          <a:schemeClr val="tx1"/>
+        </a:solidFill>
+        <a:latin typeface="+mn-lt"/>
+        <a:ea typeface="+mn-ea"/>
+        <a:cs typeface="+mn-cs"/>
+      </a:defRPr>
+    </a:lvl2pPr>
+    <a:lvl3pPr marL="914400" algn="l" defTabSz="914400" rtl="0" eaLnBrk="1" latinLnBrk="0" hangingPunct="1">
+      <a:defRPr sz="1200" kern="1200">
+        <a:solidFill>
+          <a:schemeClr val="tx1"/>
+        </a:solidFill>
+        <a:latin typeface="+mn-lt"/>
+        <a:ea typeface="+mn-ea"/>
+        <a:cs typeface="+mn-cs"/>
+      </a:defRPr>
+    </a:lvl3pPr>
+    <a:lvl4pPr marL="1371600" algn="l" defTabSz="914400" rtl="0" eaLnBrk="1" latinLnBrk="0" hangingPunct="1">
+      <a:defRPr sz="1200" kern="1200">
+        <a:solidFill>
+          <a:schemeClr val="tx1"/>
+        </a:solidFill>
+        <a:latin typeface="+mn-lt"/>
+        <a:ea typeface="+mn-ea"/>
+        <a:cs typeface="+mn-cs"/>
+      </a:defRPr>
+    </a:lvl4pPr>
+    <a:lvl5pPr marL="1828800" algn="l" defTabSz="914400" rtl="0" eaLnBrk="1" latinLnBrk="0" hangingPunct="1">
+      <a:defRPr sz="1200" kern="1200">
+        <a:solidFill>
+          <a:schemeClr val="tx1"/>
+        </a:solidFill>
+        <a:latin typeface="+mn-lt"/>
+        <a:ea typeface="+mn-ea"/>
+        <a:cs typeface="+mn-cs"/>
+      </a:defRPr>
+    </a:lvl5pPr>
+    <a:lvl6pPr marL="2286000" algn="l" defTabSz="914400" rtl="0" eaLnBrk="1" latinLnBrk="0" hangingPunct="1">
+      <a:defRPr sz="1200" kern="1200">
+        <a:solidFill>
+          <a:schemeClr val="tx1"/>
+        </a:solidFill>
+        <a:latin typeface="+mn-lt"/>
+        <a:ea typeface="+mn-ea"/>
+        <a:cs typeface="+mn-cs"/>
+      </a:defRPr>
+    </a:lvl6pPr>
+    <a:lvl7pPr marL="2743200" algn="l" defTabSz="914400" rtl="0" eaLnBrk="1" latinLnBrk="0" hangingPunct="1">
+      <a:defRPr sz="1200" kern="1200">
+        <a:solidFill>
+          <a:schemeClr val="tx1"/>
+        </a:solidFill>
+        <a:latin typeface="+mn-lt"/>
+        <a:ea typeface="+mn-ea"/>
+        <a:cs typeface="+mn-cs"/>
+      </a:defRPr>
+    </a:lvl7pPr>
+    <a:lvl8pPr marL="3200400" algn="l" defTabSz="914400" rtl="0" eaLnBrk="1" latinLnBrk="0" hangingPunct="1">
+      <a:defRPr sz="1200" kern="1200">
+        <a:solidFill>
+          <a:schemeClr val="tx1"/>
+        </a:solidFill>
+        <a:latin typeface="+mn-lt"/>
+        <a:ea typeface="+mn-ea"/>
+        <a:cs typeface="+mn-cs"/>
+      </a:defRPr>
+    </a:lvl8pPr>
+    <a:lvl9pPr marL="3657600" algn="l" defTabSz="914400" rtl="0" eaLnBrk="1" latinLnBrk="0" hangingPunct="1">
+      <a:defRPr sz="1200" kern="1200">
+        <a:solidFill>
+          <a:schemeClr val="tx1"/>
+        </a:solidFill>
+        <a:latin typeface="+mn-lt"/>
+        <a:ea typeface="+mn-ea"/>
+        <a:cs typeface="+mn-cs"/>
+      </a:defRPr>
+    </a:lvl9pPr>
+  </p:notesStyle>
+</p:notesMaster>
+</file>
+
+<file path=ppt/notesSlides/notesSlide1.xml><?xml version="1.0" encoding="utf-8"?>
+<p:notes xmlns:a="http://schemas.openxmlformats.org/drawingml/2006/main" xmlns:r="http://schemas.openxmlformats.org/officeDocument/2006/relationships" xmlns:p="http://schemas.openxmlformats.org/presentationml/2006/main">
+  <p:cSld>
+    <p:spTree>
+      <p:nvGrpSpPr>
+        <p:cNvPr id="1" name=""/>
+        <p:cNvGrpSpPr/>
+        <p:nvPr/>
+      </p:nvGrpSpPr>
+      <p:grpSpPr>
+        <a:xfrm>
+          <a:off x="0" y="0"/>
+          <a:ext cx="0" cy="0"/>
+          <a:chOff x="0" y="0"/>
+          <a:chExt cx="0" cy="0"/>
+        </a:xfrm>
+      </p:grpSpPr>
+      <p:sp>
+        <p:nvSpPr>
+          <p:cNvPr id="2" name="Slide Image Placeholder 1"/>
+          <p:cNvSpPr>
+            <a:spLocks noGrp="1" noRot="1" noChangeAspect="1"/>
+          </p:cNvSpPr>
+          <p:nvPr>
+            <p:ph type="sldImg"/>
+          </p:nvPr>
+        </p:nvSpPr>
+        <p:spPr/>
+      </p:sp>
+      <p:sp>
+        <p:nvSpPr>
+          <p:cNvPr id="3" name="Notes Placeholder 2"/>
+          <p:cNvSpPr>
+            <a:spLocks noGrp="1"/>
+          </p:cNvSpPr>
+          <p:nvPr>
+            <p:ph type="body" idx="1"/>
+          </p:nvPr>
+        </p:nvSpPr>
+        <p:spPr/>
+        <p:txBody>
+          <a:bodyPr/>
+          <a:lstStyle/>
+          <a:p>
+            <a:r>
+              <a:rPr lang="en-CA" dirty="0" smtClean="0"/>
+              <a:t>Counts</a:t>
+            </a:r>
+            <a:r>
+              <a:rPr lang="en-CA" baseline="0" dirty="0" smtClean="0"/>
+              <a:t> are number of cases in FY 16/17</a:t>
+            </a:r>
+          </a:p>
+          <a:p>
+            <a:endParaRPr lang="en-CA" baseline="0" dirty="0" smtClean="0"/>
+          </a:p>
+          <a:p>
+            <a:r>
+              <a:rPr lang="en-CA" baseline="0" dirty="0" smtClean="0"/>
+              <a:t>Ratio&gt;interval&gt;ordinal&gt;categorical variables</a:t>
+            </a:r>
+          </a:p>
+          <a:p>
+            <a:endParaRPr lang="en-CA" baseline="0" dirty="0" smtClean="0"/>
+          </a:p>
+          <a:p>
+            <a:endParaRPr lang="en-CA" dirty="0"/>
+          </a:p>
+        </p:txBody>
+      </p:sp>
+      <p:sp>
+        <p:nvSpPr>
+          <p:cNvPr id="4" name="Slide Number Placeholder 3"/>
+          <p:cNvSpPr>
+            <a:spLocks noGrp="1"/>
+          </p:cNvSpPr>
+          <p:nvPr>
+            <p:ph type="sldNum" sz="quarter" idx="10"/>
+          </p:nvPr>
+        </p:nvSpPr>
+        <p:spPr/>
+        <p:txBody>
+          <a:bodyPr/>
+          <a:lstStyle/>
+          <a:p>
+            <a:fld id="{724C6C8E-524E-4E9A-9370-4C652C275164}" type="slidenum">
+              <a:rPr lang="en-CA" smtClean="0"/>
+              <a:t>3</a:t>
+            </a:fld>
+            <a:endParaRPr lang="en-CA"/>
+          </a:p>
+        </p:txBody>
+      </p:sp>
+    </p:spTree>
+    <p:extLst>
+      <p:ext uri="{BB962C8B-B14F-4D97-AF65-F5344CB8AC3E}">
+        <p14:creationId xmlns:p14="http://schemas.microsoft.com/office/powerpoint/2010/main" val="3147522631"/>
+      </p:ext>
+    </p:extLst>
+  </p:cSld>
+  <p:clrMapOvr>
+    <a:masterClrMapping/>
+  </p:clrMapOvr>
+</p:notes>
 </file>
 
 <file path=ppt/slideLayouts/slideLayout1.xml><?xml version="1.0" encoding="utf-8"?>
@@ -4948,7 +5407,7 @@
           </p:nvPr>
         </p:nvPicPr>
         <p:blipFill>
-          <a:blip r:embed="rId2">
+          <a:blip r:embed="rId3">
             <a:extLst>
               <a:ext uri="{28A0092B-C50C-407E-A947-70E740481C1C}">
                 <a14:useLocalDpi xmlns:a14="http://schemas.microsoft.com/office/drawing/2010/main" val="0"/>
@@ -4962,7 +5421,7 @@
         </p:blipFill>
         <p:spPr bwMode="auto">
           <a:xfrm>
-            <a:off x="990600" y="2123268"/>
+            <a:off x="918866" y="2123268"/>
             <a:ext cx="7848600" cy="3591732"/>
           </a:xfrm>
           <a:prstGeom prst="rect">
@@ -5001,7 +5460,7 @@
         </p:nvSpPr>
         <p:spPr>
           <a:xfrm>
-            <a:off x="5257800" y="1524000"/>
+            <a:off x="5186066" y="1524000"/>
             <a:ext cx="3706464" cy="461665"/>
           </a:xfrm>
           <a:prstGeom prst="rect">
@@ -5039,7 +5498,7 @@
         </p:nvSpPr>
         <p:spPr>
           <a:xfrm rot="16200000">
-            <a:off x="-682409" y="3773176"/>
+            <a:off x="-754143" y="3773176"/>
             <a:ext cx="2579552" cy="461665"/>
           </a:xfrm>
           <a:prstGeom prst="rect">
@@ -5077,7 +5536,7 @@
         </p:nvSpPr>
         <p:spPr>
           <a:xfrm>
-            <a:off x="5257800" y="3276600"/>
+            <a:off x="5186066" y="3276600"/>
             <a:ext cx="838200" cy="381000"/>
           </a:xfrm>
           <a:prstGeom prst="ellipse">
@@ -5123,7 +5582,7 @@
         </p:nvSpPr>
         <p:spPr>
           <a:xfrm rot="12294958">
-            <a:off x="4921973" y="3536886"/>
+            <a:off x="4850239" y="3536886"/>
             <a:ext cx="202370" cy="2444868"/>
           </a:xfrm>
           <a:prstGeom prst="upArrow">
@@ -5176,7 +5635,7 @@
         </p:nvSpPr>
         <p:spPr>
           <a:xfrm>
-            <a:off x="3619325" y="5867400"/>
+            <a:off x="3547591" y="5867400"/>
             <a:ext cx="1790875" cy="461665"/>
           </a:xfrm>
           <a:prstGeom prst="rect">
@@ -5203,6 +5662,216 @@
                 <a:schemeClr val="tx2"/>
               </a:solidFill>
             </a:endParaRPr>
+          </a:p>
+        </p:txBody>
+      </p:sp>
+      <p:sp>
+        <p:nvSpPr>
+          <p:cNvPr id="11" name="TextBox 10"/>
+          <p:cNvSpPr txBox="1"/>
+          <p:nvPr/>
+        </p:nvSpPr>
+        <p:spPr>
+          <a:xfrm>
+            <a:off x="8763000" y="1981200"/>
+            <a:ext cx="415498" cy="369332"/>
+          </a:xfrm>
+          <a:prstGeom prst="rect">
+            <a:avLst/>
+          </a:prstGeom>
+          <a:noFill/>
+        </p:spPr>
+        <p:txBody>
+          <a:bodyPr wrap="none" rtlCol="0">
+            <a:spAutoFit/>
+          </a:bodyPr>
+          <a:lstStyle/>
+          <a:p>
+            <a:r>
+              <a:rPr lang="en-CA" dirty="0" smtClean="0"/>
+              <a:t>…</a:t>
+            </a:r>
+            <a:endParaRPr lang="en-CA" dirty="0"/>
+          </a:p>
+        </p:txBody>
+      </p:sp>
+      <p:sp>
+        <p:nvSpPr>
+          <p:cNvPr id="19" name="TextBox 18"/>
+          <p:cNvSpPr txBox="1"/>
+          <p:nvPr/>
+        </p:nvSpPr>
+        <p:spPr>
+          <a:xfrm rot="5400000">
+            <a:off x="1348517" y="5814283"/>
+            <a:ext cx="415498" cy="369332"/>
+          </a:xfrm>
+          <a:prstGeom prst="rect">
+            <a:avLst/>
+          </a:prstGeom>
+          <a:noFill/>
+        </p:spPr>
+        <p:txBody>
+          <a:bodyPr wrap="none" rtlCol="0">
+            <a:spAutoFit/>
+          </a:bodyPr>
+          <a:lstStyle/>
+          <a:p>
+            <a:r>
+              <a:rPr lang="en-CA" dirty="0" smtClean="0"/>
+              <a:t>…</a:t>
+            </a:r>
+            <a:endParaRPr lang="en-CA" dirty="0"/>
+          </a:p>
+        </p:txBody>
+      </p:sp>
+      <p:sp>
+        <p:nvSpPr>
+          <p:cNvPr id="20" name="TextBox 19"/>
+          <p:cNvSpPr txBox="1"/>
+          <p:nvPr/>
+        </p:nvSpPr>
+        <p:spPr>
+          <a:xfrm rot="5400000">
+            <a:off x="2034317" y="5820474"/>
+            <a:ext cx="415498" cy="369332"/>
+          </a:xfrm>
+          <a:prstGeom prst="rect">
+            <a:avLst/>
+          </a:prstGeom>
+          <a:noFill/>
+        </p:spPr>
+        <p:txBody>
+          <a:bodyPr wrap="none" rtlCol="0">
+            <a:spAutoFit/>
+          </a:bodyPr>
+          <a:lstStyle/>
+          <a:p>
+            <a:r>
+              <a:rPr lang="en-CA" dirty="0" smtClean="0"/>
+              <a:t>…</a:t>
+            </a:r>
+            <a:endParaRPr lang="en-CA" dirty="0"/>
+          </a:p>
+        </p:txBody>
+      </p:sp>
+      <p:sp>
+        <p:nvSpPr>
+          <p:cNvPr id="21" name="TextBox 20"/>
+          <p:cNvSpPr txBox="1"/>
+          <p:nvPr/>
+        </p:nvSpPr>
+        <p:spPr>
+          <a:xfrm rot="5400000">
+            <a:off x="2731785" y="5814283"/>
+            <a:ext cx="415498" cy="369332"/>
+          </a:xfrm>
+          <a:prstGeom prst="rect">
+            <a:avLst/>
+          </a:prstGeom>
+          <a:noFill/>
+        </p:spPr>
+        <p:txBody>
+          <a:bodyPr wrap="none" rtlCol="0">
+            <a:spAutoFit/>
+          </a:bodyPr>
+          <a:lstStyle/>
+          <a:p>
+            <a:r>
+              <a:rPr lang="en-CA" dirty="0" smtClean="0"/>
+              <a:t>…</a:t>
+            </a:r>
+            <a:endParaRPr lang="en-CA" dirty="0"/>
+          </a:p>
+        </p:txBody>
+      </p:sp>
+      <p:sp>
+        <p:nvSpPr>
+          <p:cNvPr id="22" name="TextBox 21"/>
+          <p:cNvSpPr txBox="1"/>
+          <p:nvPr/>
+        </p:nvSpPr>
+        <p:spPr>
+          <a:xfrm>
+            <a:off x="8763000" y="2971800"/>
+            <a:ext cx="415498" cy="369332"/>
+          </a:xfrm>
+          <a:prstGeom prst="rect">
+            <a:avLst/>
+          </a:prstGeom>
+          <a:noFill/>
+        </p:spPr>
+        <p:txBody>
+          <a:bodyPr wrap="none" rtlCol="0">
+            <a:spAutoFit/>
+          </a:bodyPr>
+          <a:lstStyle/>
+          <a:p>
+            <a:r>
+              <a:rPr lang="en-CA" dirty="0" smtClean="0"/>
+              <a:t>…</a:t>
+            </a:r>
+            <a:endParaRPr lang="en-CA" dirty="0"/>
+          </a:p>
+        </p:txBody>
+      </p:sp>
+      <p:sp>
+        <p:nvSpPr>
+          <p:cNvPr id="23" name="TextBox 22"/>
+          <p:cNvSpPr txBox="1"/>
+          <p:nvPr/>
+        </p:nvSpPr>
+        <p:spPr>
+          <a:xfrm>
+            <a:off x="8763000" y="4004008"/>
+            <a:ext cx="415498" cy="369332"/>
+          </a:xfrm>
+          <a:prstGeom prst="rect">
+            <a:avLst/>
+          </a:prstGeom>
+          <a:noFill/>
+        </p:spPr>
+        <p:txBody>
+          <a:bodyPr wrap="none" rtlCol="0">
+            <a:spAutoFit/>
+          </a:bodyPr>
+          <a:lstStyle/>
+          <a:p>
+            <a:r>
+              <a:rPr lang="en-CA" dirty="0" smtClean="0"/>
+              <a:t>…</a:t>
+            </a:r>
+            <a:endParaRPr lang="en-CA" dirty="0"/>
+          </a:p>
+        </p:txBody>
+      </p:sp>
+      <p:sp>
+        <p:nvSpPr>
+          <p:cNvPr id="24" name="TextBox 23"/>
+          <p:cNvSpPr txBox="1"/>
+          <p:nvPr/>
+        </p:nvSpPr>
+        <p:spPr>
+          <a:xfrm>
+            <a:off x="8763000" y="5293785"/>
+            <a:ext cx="415498" cy="369332"/>
+          </a:xfrm>
+          <a:prstGeom prst="rect">
+            <a:avLst/>
+          </a:prstGeom>
+          <a:noFill/>
+        </p:spPr>
+        <p:txBody>
+          <a:bodyPr wrap="none" rtlCol="0">
+            <a:spAutoFit/>
+          </a:bodyPr>
+          <a:lstStyle/>
+          <a:p>
+            <a:r>
+              <a:rPr lang="en-CA" dirty="0" smtClean="0"/>
+              <a:t>…</a:t>
+            </a:r>
+            <a:endParaRPr lang="en-CA" dirty="0"/>
           </a:p>
         </p:txBody>
       </p:sp>
@@ -5286,6 +5955,16 @@
           <a:bodyPr/>
           <a:lstStyle/>
           <a:p>
+            <a:pPr marL="0" indent="0">
+              <a:buNone/>
+            </a:pPr>
+            <a:r>
+              <a:rPr lang="en-CA" sz="2400" b="1" dirty="0" smtClean="0"/>
+              <a:t>Key Questions: </a:t>
+            </a:r>
+            <a:endParaRPr lang="en-CA" sz="2400" b="1" dirty="0" smtClean="0"/>
+          </a:p>
+          <a:p>
             <a:r>
               <a:rPr lang="en-CA" sz="2400" dirty="0" smtClean="0"/>
               <a:t>Which rows are closely related to other rows? </a:t>
@@ -5302,13 +5981,81 @@
               <a:rPr lang="en-CA" sz="2400" dirty="0" smtClean="0"/>
               <a:t>What are the relationships between rows and columns? </a:t>
             </a:r>
+          </a:p>
+          <a:p>
+            <a:r>
+              <a:rPr lang="en-CA" sz="2400" dirty="0" smtClean="0"/>
+              <a:t>What are the key dimensions of variation in the data? </a:t>
+            </a:r>
+          </a:p>
+          <a:p>
             <a:endParaRPr lang="en-CA" sz="2400" dirty="0" smtClean="0"/>
           </a:p>
           <a:p>
+            <a:pPr marL="0" indent="0">
+              <a:buNone/>
+            </a:pPr>
             <a:endParaRPr lang="en-CA" sz="2400" dirty="0" smtClean="0"/>
           </a:p>
-          <a:p>
-            <a:endParaRPr lang="en-CA" sz="2400" dirty="0" smtClean="0"/>
+        </p:txBody>
+      </p:sp>
+      <p:sp>
+        <p:nvSpPr>
+          <p:cNvPr id="4" name="Rectangle 3"/>
+          <p:cNvSpPr/>
+          <p:nvPr/>
+        </p:nvSpPr>
+        <p:spPr>
+          <a:xfrm>
+            <a:off x="1181100" y="4495800"/>
+            <a:ext cx="6781800" cy="990600"/>
+          </a:xfrm>
+          <a:prstGeom prst="rect">
+            <a:avLst/>
+          </a:prstGeom>
+        </p:spPr>
+        <p:style>
+          <a:lnRef idx="2">
+            <a:schemeClr val="accent1">
+              <a:shade val="50000"/>
+            </a:schemeClr>
+          </a:lnRef>
+          <a:fillRef idx="1">
+            <a:schemeClr val="accent1"/>
+          </a:fillRef>
+          <a:effectRef idx="0">
+            <a:schemeClr val="accent1"/>
+          </a:effectRef>
+          <a:fontRef idx="minor">
+            <a:schemeClr val="lt1"/>
+          </a:fontRef>
+        </p:style>
+        <p:txBody>
+          <a:bodyPr rtlCol="0" anchor="ctr"/>
+          <a:lstStyle/>
+          <a:p>
+            <a:pPr algn="ctr"/>
+            <a:r>
+              <a:rPr lang="en-CA" sz="2000" b="1" dirty="0">
+                <a:solidFill>
+                  <a:schemeClr val="accent2"/>
+                </a:solidFill>
+              </a:rPr>
+              <a:t>CA generalizes the idea of a scatterplot to work meaningfully with categorical </a:t>
+            </a:r>
+            <a:r>
+              <a:rPr lang="en-CA" sz="2000" b="1" dirty="0" smtClean="0">
+                <a:solidFill>
+                  <a:schemeClr val="accent2"/>
+                </a:solidFill>
+              </a:rPr>
+              <a:t>variables</a:t>
+            </a:r>
+            <a:endParaRPr lang="en-CA" sz="2000" b="1" dirty="0">
+              <a:solidFill>
+                <a:schemeClr val="accent2"/>
+              </a:solidFill>
+            </a:endParaRPr>
           </a:p>
         </p:txBody>
       </p:sp>
@@ -5349,46 +6096,233 @@
           <a:chExt cx="0" cy="0"/>
         </a:xfrm>
       </p:grpSpPr>
-      <p:sp>
-        <p:nvSpPr>
-          <p:cNvPr id="2" name="Title 1"/>
-          <p:cNvSpPr>
-            <a:spLocks noGrp="1"/>
-          </p:cNvSpPr>
-          <p:nvPr>
-            <p:ph type="title"/>
-          </p:nvPr>
-        </p:nvSpPr>
-        <p:spPr/>
-        <p:txBody>
-          <a:bodyPr/>
+      <p:pic>
+        <p:nvPicPr>
+          <p:cNvPr id="2050" name="Picture 2"/>
+          <p:cNvPicPr>
+            <a:picLocks noGrp="1" noChangeAspect="1" noChangeArrowheads="1"/>
+          </p:cNvPicPr>
+          <p:nvPr>
+            <p:ph idx="1"/>
+          </p:nvPr>
+        </p:nvPicPr>
+        <p:blipFill>
+          <a:blip r:embed="rId2">
+            <a:extLst>
+              <a:ext uri="{28A0092B-C50C-407E-A947-70E740481C1C}">
+                <a14:useLocalDpi xmlns:a14="http://schemas.microsoft.com/office/drawing/2010/main" val="0"/>
+              </a:ext>
+            </a:extLst>
+          </a:blip>
+          <a:srcRect/>
+          <a:stretch>
+            <a:fillRect/>
+          </a:stretch>
+        </p:blipFill>
+        <p:spPr bwMode="auto">
+          <a:xfrm>
+            <a:off x="76200" y="228599"/>
+            <a:ext cx="5410200" cy="6309443"/>
+          </a:xfrm>
+          <a:prstGeom prst="rect">
+            <a:avLst/>
+          </a:prstGeom>
+          <a:noFill/>
+          <a:ln>
+            <a:noFill/>
+          </a:ln>
+          <a:extLst>
+            <a:ext uri="{909E8E84-426E-40DD-AFC4-6F175D3DCCD1}">
+              <a14:hiddenFill xmlns:a14="http://schemas.microsoft.com/office/drawing/2010/main">
+                <a:solidFill>
+                  <a:schemeClr val="accent1"/>
+                </a:solidFill>
+              </a14:hiddenFill>
+            </a:ext>
+            <a:ext uri="{91240B29-F687-4F45-9708-019B960494DF}">
+              <a14:hiddenLine xmlns:a14="http://schemas.microsoft.com/office/drawing/2010/main" w="9525">
+                <a:solidFill>
+                  <a:schemeClr val="tx1"/>
+                </a:solidFill>
+                <a:miter lim="800000"/>
+                <a:headEnd/>
+                <a:tailEnd/>
+              </a14:hiddenLine>
+            </a:ext>
+          </a:extLst>
+        </p:spPr>
+      </p:pic>
+      <p:pic>
+        <p:nvPicPr>
+          <p:cNvPr id="2051" name="Picture 3"/>
+          <p:cNvPicPr>
+            <a:picLocks noChangeAspect="1" noChangeArrowheads="1"/>
+          </p:cNvPicPr>
+          <p:nvPr/>
+        </p:nvPicPr>
+        <p:blipFill>
+          <a:blip r:embed="rId3">
+            <a:extLst>
+              <a:ext uri="{28A0092B-C50C-407E-A947-70E740481C1C}">
+                <a14:useLocalDpi xmlns:a14="http://schemas.microsoft.com/office/drawing/2010/main" val="0"/>
+              </a:ext>
+            </a:extLst>
+          </a:blip>
+          <a:srcRect/>
+          <a:stretch>
+            <a:fillRect/>
+          </a:stretch>
+        </p:blipFill>
+        <p:spPr bwMode="auto">
+          <a:xfrm>
+            <a:off x="1855618" y="6553200"/>
+            <a:ext cx="1790700" cy="257175"/>
+          </a:xfrm>
+          <a:prstGeom prst="rect">
+            <a:avLst/>
+          </a:prstGeom>
+          <a:noFill/>
+          <a:ln>
+            <a:noFill/>
+          </a:ln>
+          <a:extLst>
+            <a:ext uri="{909E8E84-426E-40DD-AFC4-6F175D3DCCD1}">
+              <a14:hiddenFill xmlns:a14="http://schemas.microsoft.com/office/drawing/2010/main">
+                <a:solidFill>
+                  <a:schemeClr val="accent1"/>
+                </a:solidFill>
+              </a14:hiddenFill>
+            </a:ext>
+            <a:ext uri="{91240B29-F687-4F45-9708-019B960494DF}">
+              <a14:hiddenLine xmlns:a14="http://schemas.microsoft.com/office/drawing/2010/main" w="9525">
+                <a:solidFill>
+                  <a:schemeClr val="tx1"/>
+                </a:solidFill>
+                <a:miter lim="800000"/>
+                <a:headEnd/>
+                <a:tailEnd/>
+              </a14:hiddenLine>
+            </a:ext>
+          </a:extLst>
+        </p:spPr>
+      </p:pic>
+      <p:pic>
+        <p:nvPicPr>
+          <p:cNvPr id="2052" name="Picture 4"/>
+          <p:cNvPicPr>
+            <a:picLocks noChangeAspect="1" noChangeArrowheads="1"/>
+          </p:cNvPicPr>
+          <p:nvPr/>
+        </p:nvPicPr>
+        <p:blipFill>
+          <a:blip r:embed="rId4">
+            <a:extLst>
+              <a:ext uri="{28A0092B-C50C-407E-A947-70E740481C1C}">
+                <a14:useLocalDpi xmlns:a14="http://schemas.microsoft.com/office/drawing/2010/main" val="0"/>
+              </a:ext>
+            </a:extLst>
+          </a:blip>
+          <a:srcRect/>
+          <a:stretch>
+            <a:fillRect/>
+          </a:stretch>
+        </p:blipFill>
+        <p:spPr bwMode="auto">
+          <a:xfrm>
+            <a:off x="123825" y="2057400"/>
+            <a:ext cx="257175" cy="2933700"/>
+          </a:xfrm>
+          <a:prstGeom prst="rect">
+            <a:avLst/>
+          </a:prstGeom>
+          <a:noFill/>
+          <a:ln>
+            <a:noFill/>
+          </a:ln>
+          <a:extLst>
+            <a:ext uri="{909E8E84-426E-40DD-AFC4-6F175D3DCCD1}">
+              <a14:hiddenFill xmlns:a14="http://schemas.microsoft.com/office/drawing/2010/main">
+                <a:solidFill>
+                  <a:schemeClr val="accent1"/>
+                </a:solidFill>
+              </a14:hiddenFill>
+            </a:ext>
+            <a:ext uri="{91240B29-F687-4F45-9708-019B960494DF}">
+              <a14:hiddenLine xmlns:a14="http://schemas.microsoft.com/office/drawing/2010/main" w="9525">
+                <a:solidFill>
+                  <a:schemeClr val="tx1"/>
+                </a:solidFill>
+                <a:miter lim="800000"/>
+                <a:headEnd/>
+                <a:tailEnd/>
+              </a14:hiddenLine>
+            </a:ext>
+          </a:extLst>
+        </p:spPr>
+      </p:pic>
+      <p:sp>
+        <p:nvSpPr>
+          <p:cNvPr id="5" name="TextBox 4"/>
+          <p:cNvSpPr txBox="1"/>
+          <p:nvPr/>
+        </p:nvSpPr>
+        <p:spPr>
+          <a:xfrm>
+            <a:off x="5715000" y="1734234"/>
+            <a:ext cx="3276600" cy="1015663"/>
+          </a:xfrm>
+          <a:prstGeom prst="rect">
+            <a:avLst/>
+          </a:prstGeom>
+          <a:noFill/>
+        </p:spPr>
+        <p:txBody>
+          <a:bodyPr wrap="square" rtlCol="0">
+            <a:spAutoFit/>
+          </a:bodyPr>
           <a:lstStyle/>
           <a:p>
+            <a:r>
+              <a:rPr lang="en-CA" sz="2000" dirty="0" smtClean="0"/>
+              <a:t>Can we produce something </a:t>
+            </a:r>
+          </a:p>
+          <a:p>
+            <a:r>
+              <a:rPr lang="en-CA" sz="2000" dirty="0" smtClean="0"/>
+              <a:t>like this for categorical variables? </a:t>
+            </a:r>
+            <a:endParaRPr lang="en-CA" sz="2000" dirty="0"/>
+          </a:p>
+        </p:txBody>
+      </p:sp>
+      <p:sp>
+        <p:nvSpPr>
+          <p:cNvPr id="6" name="TextBox 5"/>
+          <p:cNvSpPr txBox="1"/>
+          <p:nvPr/>
+        </p:nvSpPr>
+        <p:spPr>
+          <a:xfrm>
+            <a:off x="5729056" y="2787017"/>
+            <a:ext cx="689291" cy="369332"/>
+          </a:xfrm>
+          <a:prstGeom prst="rect">
+            <a:avLst/>
+          </a:prstGeom>
+          <a:noFill/>
+        </p:spPr>
+        <p:txBody>
+          <a:bodyPr wrap="none" rtlCol="0">
+            <a:spAutoFit/>
+          </a:bodyPr>
+          <a:lstStyle/>
+          <a:p>
+            <a:r>
+              <a:rPr lang="en-CA" dirty="0" smtClean="0"/>
+              <a:t>Yes! </a:t>
+            </a:r>
             <a:endParaRPr lang="en-CA" dirty="0"/>
-          </a:p>
-        </p:txBody>
-      </p:sp>
-      <p:sp>
-        <p:nvSpPr>
-          <p:cNvPr id="3" name="Content Placeholder 2"/>
-          <p:cNvSpPr>
-            <a:spLocks noGrp="1"/>
-          </p:cNvSpPr>
-          <p:nvPr>
-            <p:ph idx="1"/>
-          </p:nvPr>
-        </p:nvSpPr>
-        <p:spPr>
-          <a:xfrm>
-            <a:off x="457200" y="1295400"/>
-            <a:ext cx="8229600" cy="4525963"/>
-          </a:xfrm>
-        </p:spPr>
-        <p:txBody>
-          <a:bodyPr/>
-          <a:lstStyle/>
-          <a:p>
-            <a:endParaRPr lang="en-CA" sz="2400" dirty="0" smtClean="0"/>
           </a:p>
         </p:txBody>
       </p:sp>
@@ -5431,6 +6365,52 @@
       </p:grpSpPr>
       <p:sp>
         <p:nvSpPr>
+          <p:cNvPr id="8" name="Rectangle 7"/>
+          <p:cNvSpPr/>
+          <p:nvPr/>
+        </p:nvSpPr>
+        <p:spPr>
+          <a:xfrm>
+            <a:off x="-1" y="5973763"/>
+            <a:ext cx="2108735" cy="579437"/>
+          </a:xfrm>
+          <a:prstGeom prst="rect">
+            <a:avLst/>
+          </a:prstGeom>
+          <a:solidFill>
+            <a:schemeClr val="bg1"/>
+          </a:solidFill>
+          <a:ln>
+            <a:noFill/>
+          </a:ln>
+        </p:spPr>
+        <p:style>
+          <a:lnRef idx="2">
+            <a:schemeClr val="accent1">
+              <a:shade val="50000"/>
+            </a:schemeClr>
+          </a:lnRef>
+          <a:fillRef idx="1">
+            <a:schemeClr val="accent1"/>
+          </a:fillRef>
+          <a:effectRef idx="0">
+            <a:schemeClr val="accent1"/>
+          </a:effectRef>
+          <a:fontRef idx="minor">
+            <a:schemeClr val="lt1"/>
+          </a:fontRef>
+        </p:style>
+        <p:txBody>
+          <a:bodyPr rtlCol="0" anchor="ctr"/>
+          <a:lstStyle/>
+          <a:p>
+            <a:pPr algn="ctr"/>
+            <a:endParaRPr lang="en-CA"/>
+          </a:p>
+        </p:txBody>
+      </p:sp>
+      <p:sp>
+        <p:nvSpPr>
           <p:cNvPr id="2" name="Title 1"/>
           <p:cNvSpPr>
             <a:spLocks noGrp="1"/>
@@ -5444,31 +6424,281 @@
           <a:bodyPr/>
           <a:lstStyle/>
           <a:p>
+            <a:r>
+              <a:rPr lang="en-CA" dirty="0" smtClean="0"/>
+              <a:t>Relationship to previous methodology </a:t>
+            </a:r>
             <a:endParaRPr lang="en-CA" dirty="0"/>
           </a:p>
         </p:txBody>
       </p:sp>
-      <p:sp>
-        <p:nvSpPr>
-          <p:cNvPr id="3" name="Content Placeholder 2"/>
-          <p:cNvSpPr>
-            <a:spLocks noGrp="1"/>
-          </p:cNvSpPr>
+      <p:pic>
+        <p:nvPicPr>
+          <p:cNvPr id="3074" name="Picture 2"/>
+          <p:cNvPicPr>
+            <a:picLocks noGrp="1" noChangeAspect="1" noChangeArrowheads="1"/>
+          </p:cNvPicPr>
           <p:nvPr>
             <p:ph idx="1"/>
           </p:nvPr>
-        </p:nvSpPr>
-        <p:spPr>
+        </p:nvPicPr>
+        <p:blipFill>
+          <a:blip r:embed="rId2">
+            <a:extLst>
+              <a:ext uri="{28A0092B-C50C-407E-A947-70E740481C1C}">
+                <a14:useLocalDpi xmlns:a14="http://schemas.microsoft.com/office/drawing/2010/main" val="0"/>
+              </a:ext>
+            </a:extLst>
+          </a:blip>
+          <a:srcRect/>
+          <a:stretch>
+            <a:fillRect/>
+          </a:stretch>
+        </p:blipFill>
+        <p:spPr bwMode="auto">
           <a:xfrm>
-            <a:off x="457200" y="1295400"/>
-            <a:ext cx="8229600" cy="4525963"/>
+            <a:off x="1765779" y="1616828"/>
+            <a:ext cx="5612443" cy="2955172"/>
           </a:xfrm>
-        </p:spPr>
-        <p:txBody>
-          <a:bodyPr/>
-          <a:lstStyle/>
-          <a:p>
-            <a:endParaRPr lang="en-CA" sz="2400" dirty="0" smtClean="0"/>
+          <a:prstGeom prst="rect">
+            <a:avLst/>
+          </a:prstGeom>
+          <a:ln w="9525">
+            <a:solidFill>
+              <a:schemeClr val="tx1"/>
+            </a:solidFill>
+            <a:miter lim="800000"/>
+            <a:headEnd/>
+            <a:tailEnd/>
+          </a:ln>
+          <a:effectLst>
+            <a:outerShdw blurRad="292100" dist="139700" dir="2700000" algn="tl" rotWithShape="0">
+              <a:srgbClr val="333333">
+                <a:alpha val="65000"/>
+              </a:srgbClr>
+            </a:outerShdw>
+          </a:effectLst>
+          <a:extLst>
+            <a:ext uri="{909E8E84-426E-40DD-AFC4-6F175D3DCCD1}">
+              <a14:hiddenFill xmlns:a14="http://schemas.microsoft.com/office/drawing/2010/main">
+                <a:solidFill>
+                  <a:schemeClr val="accent1"/>
+                </a:solidFill>
+              </a14:hiddenFill>
+            </a:ext>
+          </a:extLst>
+        </p:spPr>
+      </p:pic>
+      <p:sp>
+        <p:nvSpPr>
+          <p:cNvPr id="6" name="Content Placeholder 2"/>
+          <p:cNvSpPr txBox="1">
+            <a:spLocks/>
+          </p:cNvSpPr>
+          <p:nvPr/>
+        </p:nvSpPr>
+        <p:spPr bwMode="auto">
+          <a:xfrm>
+            <a:off x="457200" y="4800600"/>
+            <a:ext cx="8229600" cy="1020763"/>
+          </a:xfrm>
+          <a:prstGeom prst="rect">
+            <a:avLst/>
+          </a:prstGeom>
+          <a:noFill/>
+          <a:ln>
+            <a:noFill/>
+          </a:ln>
+          <a:extLst>
+            <a:ext uri="{909E8E84-426E-40DD-AFC4-6F175D3DCCD1}">
+              <a14:hiddenFill xmlns:a14="http://schemas.microsoft.com/office/drawing/2010/main">
+                <a:solidFill>
+                  <a:srgbClr val="FFFFFF"/>
+                </a:solidFill>
+              </a14:hiddenFill>
+            </a:ext>
+            <a:ext uri="{91240B29-F687-4F45-9708-019B960494DF}">
+              <a14:hiddenLine xmlns:a14="http://schemas.microsoft.com/office/drawing/2010/main" w="9525">
+                <a:solidFill>
+                  <a:srgbClr val="000000"/>
+                </a:solidFill>
+                <a:miter lim="800000"/>
+                <a:headEnd/>
+                <a:tailEnd/>
+              </a14:hiddenLine>
+            </a:ext>
+          </a:extLst>
+        </p:spPr>
+        <p:txBody>
+          <a:bodyPr vert="horz" wrap="square" lIns="91440" tIns="45720" rIns="91440" bIns="45720" numCol="1" anchor="t" anchorCtr="0" compatLnSpc="1">
+            <a:prstTxWarp prst="textNoShape">
+              <a:avLst/>
+            </a:prstTxWarp>
+          </a:bodyPr>
+          <a:lstStyle>
+            <a:lvl1pPr marL="342900" indent="-342900" algn="l" rtl="0" eaLnBrk="1" fontAlgn="base" hangingPunct="1">
+              <a:spcBef>
+                <a:spcPct val="20000"/>
+              </a:spcBef>
+              <a:spcAft>
+                <a:spcPct val="0"/>
+              </a:spcAft>
+              <a:buChar char="•"/>
+              <a:defRPr sz="3200">
+                <a:solidFill>
+                  <a:schemeClr val="tx1"/>
+                </a:solidFill>
+                <a:latin typeface="+mn-lt"/>
+                <a:ea typeface="+mn-ea"/>
+                <a:cs typeface="+mn-cs"/>
+              </a:defRPr>
+            </a:lvl1pPr>
+            <a:lvl2pPr marL="742950" indent="-285750" algn="l" rtl="0" eaLnBrk="1" fontAlgn="base" hangingPunct="1">
+              <a:spcBef>
+                <a:spcPct val="20000"/>
+              </a:spcBef>
+              <a:spcAft>
+                <a:spcPct val="0"/>
+              </a:spcAft>
+              <a:buChar char="–"/>
+              <a:defRPr sz="2800">
+                <a:solidFill>
+                  <a:schemeClr val="tx1"/>
+                </a:solidFill>
+                <a:latin typeface="+mn-lt"/>
+              </a:defRPr>
+            </a:lvl2pPr>
+            <a:lvl3pPr marL="1143000" indent="-228600" algn="l" rtl="0" eaLnBrk="1" fontAlgn="base" hangingPunct="1">
+              <a:spcBef>
+                <a:spcPct val="20000"/>
+              </a:spcBef>
+              <a:spcAft>
+                <a:spcPct val="0"/>
+              </a:spcAft>
+              <a:buChar char="•"/>
+              <a:defRPr sz="2400">
+                <a:solidFill>
+                  <a:schemeClr val="tx1"/>
+                </a:solidFill>
+                <a:latin typeface="+mn-lt"/>
+              </a:defRPr>
+            </a:lvl3pPr>
+            <a:lvl4pPr marL="1600200" indent="-228600" algn="l" rtl="0" eaLnBrk="1" fontAlgn="base" hangingPunct="1">
+              <a:spcBef>
+                <a:spcPct val="20000"/>
+              </a:spcBef>
+              <a:spcAft>
+                <a:spcPct val="0"/>
+              </a:spcAft>
+              <a:buChar char="–"/>
+              <a:defRPr sz="2000">
+                <a:solidFill>
+                  <a:schemeClr val="tx1"/>
+                </a:solidFill>
+                <a:latin typeface="+mn-lt"/>
+              </a:defRPr>
+            </a:lvl4pPr>
+            <a:lvl5pPr marL="2057400" indent="-228600" algn="l" rtl="0" eaLnBrk="1" fontAlgn="base" hangingPunct="1">
+              <a:spcBef>
+                <a:spcPct val="20000"/>
+              </a:spcBef>
+              <a:spcAft>
+                <a:spcPct val="0"/>
+              </a:spcAft>
+              <a:buChar char="»"/>
+              <a:defRPr sz="2000">
+                <a:solidFill>
+                  <a:schemeClr val="tx1"/>
+                </a:solidFill>
+                <a:latin typeface="+mn-lt"/>
+              </a:defRPr>
+            </a:lvl5pPr>
+            <a:lvl6pPr marL="2514600" indent="-228600" algn="l" rtl="0" eaLnBrk="1" fontAlgn="base" hangingPunct="1">
+              <a:spcBef>
+                <a:spcPct val="20000"/>
+              </a:spcBef>
+              <a:spcAft>
+                <a:spcPct val="0"/>
+              </a:spcAft>
+              <a:buChar char="»"/>
+              <a:defRPr sz="2000">
+                <a:solidFill>
+                  <a:schemeClr val="tx1"/>
+                </a:solidFill>
+                <a:latin typeface="+mn-lt"/>
+              </a:defRPr>
+            </a:lvl6pPr>
+            <a:lvl7pPr marL="2971800" indent="-228600" algn="l" rtl="0" eaLnBrk="1" fontAlgn="base" hangingPunct="1">
+              <a:spcBef>
+                <a:spcPct val="20000"/>
+              </a:spcBef>
+              <a:spcAft>
+                <a:spcPct val="0"/>
+              </a:spcAft>
+              <a:buChar char="»"/>
+              <a:defRPr sz="2000">
+                <a:solidFill>
+                  <a:schemeClr val="tx1"/>
+                </a:solidFill>
+                <a:latin typeface="+mn-lt"/>
+              </a:defRPr>
+            </a:lvl7pPr>
+            <a:lvl8pPr marL="3429000" indent="-228600" algn="l" rtl="0" eaLnBrk="1" fontAlgn="base" hangingPunct="1">
+              <a:spcBef>
+                <a:spcPct val="20000"/>
+              </a:spcBef>
+              <a:spcAft>
+                <a:spcPct val="0"/>
+              </a:spcAft>
+              <a:buChar char="»"/>
+              <a:defRPr sz="2000">
+                <a:solidFill>
+                  <a:schemeClr val="tx1"/>
+                </a:solidFill>
+                <a:latin typeface="+mn-lt"/>
+              </a:defRPr>
+            </a:lvl8pPr>
+            <a:lvl9pPr marL="3886200" indent="-228600" algn="l" rtl="0" eaLnBrk="1" fontAlgn="base" hangingPunct="1">
+              <a:spcBef>
+                <a:spcPct val="20000"/>
+              </a:spcBef>
+              <a:spcAft>
+                <a:spcPct val="0"/>
+              </a:spcAft>
+              <a:buChar char="»"/>
+              <a:defRPr sz="2000">
+                <a:solidFill>
+                  <a:schemeClr val="tx1"/>
+                </a:solidFill>
+                <a:latin typeface="+mn-lt"/>
+              </a:defRPr>
+            </a:lvl9pPr>
+          </a:lstStyle>
+          <a:p>
+            <a:r>
+              <a:rPr lang="en-CA" sz="2400" kern="0" dirty="0" smtClean="0"/>
+              <a:t>CA is a complimentary approach </a:t>
+            </a:r>
+          </a:p>
+          <a:p>
+            <a:pPr lvl="1"/>
+            <a:r>
+              <a:rPr lang="en-CA" sz="1800" i="1" kern="0" dirty="0" smtClean="0"/>
+              <a:t>Manhattan distances vs. “chi-squared” distances</a:t>
+            </a:r>
+          </a:p>
+          <a:p>
+            <a:r>
+              <a:rPr lang="en-CA" sz="2400" kern="0" dirty="0" smtClean="0"/>
+              <a:t>Appeals to visual intuition </a:t>
+            </a:r>
+            <a:endParaRPr lang="en-CA" sz="2400" kern="0" dirty="0"/>
+          </a:p>
+          <a:p>
+            <a:r>
+              <a:rPr lang="en-CA" sz="2400" kern="0" dirty="0" smtClean="0"/>
+              <a:t>Widely applicable as an EDA technique</a:t>
+            </a:r>
           </a:p>
         </p:txBody>
       </p:sp>
@@ -5524,31 +6754,769 @@
           <a:bodyPr/>
           <a:lstStyle/>
           <a:p>
+            <a:r>
+              <a:rPr lang="en-CA" dirty="0" smtClean="0"/>
+              <a:t>Example: Smoking data</a:t>
+            </a:r>
             <a:endParaRPr lang="en-CA" dirty="0"/>
           </a:p>
         </p:txBody>
       </p:sp>
-      <p:sp>
-        <p:nvSpPr>
-          <p:cNvPr id="3" name="Content Placeholder 2"/>
-          <p:cNvSpPr>
-            <a:spLocks noGrp="1"/>
-          </p:cNvSpPr>
+      <p:pic>
+        <p:nvPicPr>
+          <p:cNvPr id="4098" name="Picture 2"/>
+          <p:cNvPicPr>
+            <a:picLocks noGrp="1" noChangeAspect="1" noChangeArrowheads="1"/>
+          </p:cNvPicPr>
           <p:nvPr>
             <p:ph idx="1"/>
           </p:nvPr>
-        </p:nvSpPr>
-        <p:spPr>
+        </p:nvPicPr>
+        <p:blipFill>
+          <a:blip r:embed="rId2">
+            <a:extLst>
+              <a:ext uri="{28A0092B-C50C-407E-A947-70E740481C1C}">
+                <a14:useLocalDpi xmlns:a14="http://schemas.microsoft.com/office/drawing/2010/main" val="0"/>
+              </a:ext>
+            </a:extLst>
+          </a:blip>
+          <a:srcRect/>
+          <a:stretch>
+            <a:fillRect/>
+          </a:stretch>
+        </p:blipFill>
+        <p:spPr bwMode="auto">
           <a:xfrm>
-            <a:off x="457200" y="1295400"/>
-            <a:ext cx="8229600" cy="4525963"/>
+            <a:off x="914400" y="2167585"/>
+            <a:ext cx="6172200" cy="1871015"/>
           </a:xfrm>
-        </p:spPr>
-        <p:txBody>
-          <a:bodyPr/>
+          <a:prstGeom prst="rect">
+            <a:avLst/>
+          </a:prstGeom>
+          <a:noFill/>
+          <a:ln>
+            <a:noFill/>
+          </a:ln>
+          <a:extLst>
+            <a:ext uri="{909E8E84-426E-40DD-AFC4-6F175D3DCCD1}">
+              <a14:hiddenFill xmlns:a14="http://schemas.microsoft.com/office/drawing/2010/main">
+                <a:solidFill>
+                  <a:schemeClr val="accent1"/>
+                </a:solidFill>
+              </a14:hiddenFill>
+            </a:ext>
+            <a:ext uri="{91240B29-F687-4F45-9708-019B960494DF}">
+              <a14:hiddenLine xmlns:a14="http://schemas.microsoft.com/office/drawing/2010/main" w="9525">
+                <a:solidFill>
+                  <a:schemeClr val="tx1"/>
+                </a:solidFill>
+                <a:miter lim="800000"/>
+                <a:headEnd/>
+                <a:tailEnd/>
+              </a14:hiddenLine>
+            </a:ext>
+          </a:extLst>
+        </p:spPr>
+      </p:pic>
+      <p:sp>
+        <p:nvSpPr>
+          <p:cNvPr id="5" name="Content Placeholder 2"/>
+          <p:cNvSpPr txBox="1">
+            <a:spLocks/>
+          </p:cNvSpPr>
+          <p:nvPr/>
+        </p:nvSpPr>
+        <p:spPr bwMode="auto">
+          <a:xfrm>
+            <a:off x="463617" y="1219201"/>
+            <a:ext cx="8229600" cy="685800"/>
+          </a:xfrm>
+          <a:prstGeom prst="rect">
+            <a:avLst/>
+          </a:prstGeom>
+          <a:noFill/>
+          <a:ln>
+            <a:noFill/>
+          </a:ln>
+          <a:extLst>
+            <a:ext uri="{909E8E84-426E-40DD-AFC4-6F175D3DCCD1}">
+              <a14:hiddenFill xmlns:a14="http://schemas.microsoft.com/office/drawing/2010/main">
+                <a:solidFill>
+                  <a:srgbClr val="FFFFFF"/>
+                </a:solidFill>
+              </a14:hiddenFill>
+            </a:ext>
+            <a:ext uri="{91240B29-F687-4F45-9708-019B960494DF}">
+              <a14:hiddenLine xmlns:a14="http://schemas.microsoft.com/office/drawing/2010/main" w="9525">
+                <a:solidFill>
+                  <a:srgbClr val="000000"/>
+                </a:solidFill>
+                <a:miter lim="800000"/>
+                <a:headEnd/>
+                <a:tailEnd/>
+              </a14:hiddenLine>
+            </a:ext>
+          </a:extLst>
+        </p:spPr>
+        <p:txBody>
+          <a:bodyPr vert="horz" wrap="square" lIns="91440" tIns="45720" rIns="91440" bIns="45720" numCol="1" anchor="t" anchorCtr="0" compatLnSpc="1">
+            <a:prstTxWarp prst="textNoShape">
+              <a:avLst/>
+            </a:prstTxWarp>
+          </a:bodyPr>
+          <a:lstStyle>
+            <a:lvl1pPr marL="342900" indent="-342900" algn="l" rtl="0" eaLnBrk="1" fontAlgn="base" hangingPunct="1">
+              <a:spcBef>
+                <a:spcPct val="20000"/>
+              </a:spcBef>
+              <a:spcAft>
+                <a:spcPct val="0"/>
+              </a:spcAft>
+              <a:buChar char="•"/>
+              <a:defRPr sz="3200">
+                <a:solidFill>
+                  <a:schemeClr val="tx1"/>
+                </a:solidFill>
+                <a:latin typeface="+mn-lt"/>
+                <a:ea typeface="+mn-ea"/>
+                <a:cs typeface="+mn-cs"/>
+              </a:defRPr>
+            </a:lvl1pPr>
+            <a:lvl2pPr marL="742950" indent="-285750" algn="l" rtl="0" eaLnBrk="1" fontAlgn="base" hangingPunct="1">
+              <a:spcBef>
+                <a:spcPct val="20000"/>
+              </a:spcBef>
+              <a:spcAft>
+                <a:spcPct val="0"/>
+              </a:spcAft>
+              <a:buChar char="–"/>
+              <a:defRPr sz="2800">
+                <a:solidFill>
+                  <a:schemeClr val="tx1"/>
+                </a:solidFill>
+                <a:latin typeface="+mn-lt"/>
+              </a:defRPr>
+            </a:lvl2pPr>
+            <a:lvl3pPr marL="1143000" indent="-228600" algn="l" rtl="0" eaLnBrk="1" fontAlgn="base" hangingPunct="1">
+              <a:spcBef>
+                <a:spcPct val="20000"/>
+              </a:spcBef>
+              <a:spcAft>
+                <a:spcPct val="0"/>
+              </a:spcAft>
+              <a:buChar char="•"/>
+              <a:defRPr sz="2400">
+                <a:solidFill>
+                  <a:schemeClr val="tx1"/>
+                </a:solidFill>
+                <a:latin typeface="+mn-lt"/>
+              </a:defRPr>
+            </a:lvl3pPr>
+            <a:lvl4pPr marL="1600200" indent="-228600" algn="l" rtl="0" eaLnBrk="1" fontAlgn="base" hangingPunct="1">
+              <a:spcBef>
+                <a:spcPct val="20000"/>
+              </a:spcBef>
+              <a:spcAft>
+                <a:spcPct val="0"/>
+              </a:spcAft>
+              <a:buChar char="–"/>
+              <a:defRPr sz="2000">
+                <a:solidFill>
+                  <a:schemeClr val="tx1"/>
+                </a:solidFill>
+                <a:latin typeface="+mn-lt"/>
+              </a:defRPr>
+            </a:lvl4pPr>
+            <a:lvl5pPr marL="2057400" indent="-228600" algn="l" rtl="0" eaLnBrk="1" fontAlgn="base" hangingPunct="1">
+              <a:spcBef>
+                <a:spcPct val="20000"/>
+              </a:spcBef>
+              <a:spcAft>
+                <a:spcPct val="0"/>
+              </a:spcAft>
+              <a:buChar char="»"/>
+              <a:defRPr sz="2000">
+                <a:solidFill>
+                  <a:schemeClr val="tx1"/>
+                </a:solidFill>
+                <a:latin typeface="+mn-lt"/>
+              </a:defRPr>
+            </a:lvl5pPr>
+            <a:lvl6pPr marL="2514600" indent="-228600" algn="l" rtl="0" eaLnBrk="1" fontAlgn="base" hangingPunct="1">
+              <a:spcBef>
+                <a:spcPct val="20000"/>
+              </a:spcBef>
+              <a:spcAft>
+                <a:spcPct val="0"/>
+              </a:spcAft>
+              <a:buChar char="»"/>
+              <a:defRPr sz="2000">
+                <a:solidFill>
+                  <a:schemeClr val="tx1"/>
+                </a:solidFill>
+                <a:latin typeface="+mn-lt"/>
+              </a:defRPr>
+            </a:lvl6pPr>
+            <a:lvl7pPr marL="2971800" indent="-228600" algn="l" rtl="0" eaLnBrk="1" fontAlgn="base" hangingPunct="1">
+              <a:spcBef>
+                <a:spcPct val="20000"/>
+              </a:spcBef>
+              <a:spcAft>
+                <a:spcPct val="0"/>
+              </a:spcAft>
+              <a:buChar char="»"/>
+              <a:defRPr sz="2000">
+                <a:solidFill>
+                  <a:schemeClr val="tx1"/>
+                </a:solidFill>
+                <a:latin typeface="+mn-lt"/>
+              </a:defRPr>
+            </a:lvl7pPr>
+            <a:lvl8pPr marL="3429000" indent="-228600" algn="l" rtl="0" eaLnBrk="1" fontAlgn="base" hangingPunct="1">
+              <a:spcBef>
+                <a:spcPct val="20000"/>
+              </a:spcBef>
+              <a:spcAft>
+                <a:spcPct val="0"/>
+              </a:spcAft>
+              <a:buChar char="»"/>
+              <a:defRPr sz="2000">
+                <a:solidFill>
+                  <a:schemeClr val="tx1"/>
+                </a:solidFill>
+                <a:latin typeface="+mn-lt"/>
+              </a:defRPr>
+            </a:lvl8pPr>
+            <a:lvl9pPr marL="3886200" indent="-228600" algn="l" rtl="0" eaLnBrk="1" fontAlgn="base" hangingPunct="1">
+              <a:spcBef>
+                <a:spcPct val="20000"/>
+              </a:spcBef>
+              <a:spcAft>
+                <a:spcPct val="0"/>
+              </a:spcAft>
+              <a:buChar char="»"/>
+              <a:defRPr sz="2000">
+                <a:solidFill>
+                  <a:schemeClr val="tx1"/>
+                </a:solidFill>
+                <a:latin typeface="+mn-lt"/>
+              </a:defRPr>
+            </a:lvl9pPr>
+          </a:lstStyle>
+          <a:p>
+            <a:pPr marL="0" indent="0">
+              <a:buNone/>
+            </a:pPr>
+            <a:r>
+              <a:rPr lang="en-CA" sz="2400" kern="0" dirty="0" smtClean="0"/>
+              <a:t>Artificial dataset of smoking habits among 193 employees</a:t>
+            </a:r>
+          </a:p>
+        </p:txBody>
+      </p:sp>
+      <p:pic>
+        <p:nvPicPr>
+          <p:cNvPr id="4099" name="Picture 3"/>
+          <p:cNvPicPr>
+            <a:picLocks noChangeAspect="1" noChangeArrowheads="1"/>
+          </p:cNvPicPr>
+          <p:nvPr/>
+        </p:nvPicPr>
+        <p:blipFill>
+          <a:blip r:embed="rId3">
+            <a:extLst>
+              <a:ext uri="{28A0092B-C50C-407E-A947-70E740481C1C}">
+                <a14:useLocalDpi xmlns:a14="http://schemas.microsoft.com/office/drawing/2010/main" val="0"/>
+              </a:ext>
+            </a:extLst>
+          </a:blip>
+          <a:srcRect/>
+          <a:stretch>
+            <a:fillRect/>
+          </a:stretch>
+        </p:blipFill>
+        <p:spPr bwMode="auto">
+          <a:xfrm>
+            <a:off x="863121" y="2172703"/>
+            <a:ext cx="7214079" cy="1865897"/>
+          </a:xfrm>
+          <a:prstGeom prst="rect">
+            <a:avLst/>
+          </a:prstGeom>
+          <a:noFill/>
+          <a:ln>
+            <a:noFill/>
+          </a:ln>
+          <a:extLst>
+            <a:ext uri="{909E8E84-426E-40DD-AFC4-6F175D3DCCD1}">
+              <a14:hiddenFill xmlns:a14="http://schemas.microsoft.com/office/drawing/2010/main">
+                <a:solidFill>
+                  <a:schemeClr val="accent1"/>
+                </a:solidFill>
+              </a14:hiddenFill>
+            </a:ext>
+            <a:ext uri="{91240B29-F687-4F45-9708-019B960494DF}">
+              <a14:hiddenLine xmlns:a14="http://schemas.microsoft.com/office/drawing/2010/main" w="9525">
+                <a:solidFill>
+                  <a:schemeClr val="tx1"/>
+                </a:solidFill>
+                <a:miter lim="800000"/>
+                <a:headEnd/>
+                <a:tailEnd/>
+              </a14:hiddenLine>
+            </a:ext>
+          </a:extLst>
+        </p:spPr>
+      </p:pic>
+      <p:sp>
+        <p:nvSpPr>
+          <p:cNvPr id="4" name="Oval 3"/>
+          <p:cNvSpPr/>
+          <p:nvPr/>
+        </p:nvSpPr>
+        <p:spPr>
+          <a:xfrm>
+            <a:off x="7010400" y="2362200"/>
+            <a:ext cx="1295400" cy="1828800"/>
+          </a:xfrm>
+          <a:prstGeom prst="ellipse">
+            <a:avLst/>
+          </a:prstGeom>
+          <a:noFill/>
+          <a:ln>
+            <a:solidFill>
+              <a:srgbClr val="FF0000"/>
+            </a:solidFill>
+          </a:ln>
+        </p:spPr>
+        <p:style>
+          <a:lnRef idx="2">
+            <a:schemeClr val="accent1">
+              <a:shade val="50000"/>
+            </a:schemeClr>
+          </a:lnRef>
+          <a:fillRef idx="1">
+            <a:schemeClr val="accent1"/>
+          </a:fillRef>
+          <a:effectRef idx="0">
+            <a:schemeClr val="accent1"/>
+          </a:effectRef>
+          <a:fontRef idx="minor">
+            <a:schemeClr val="lt1"/>
+          </a:fontRef>
+        </p:style>
+        <p:txBody>
+          <a:bodyPr rtlCol="0" anchor="ctr"/>
           <a:lstStyle/>
           <a:p>
-            <a:endParaRPr lang="en-CA" sz="2400" dirty="0" smtClean="0"/>
+            <a:pPr algn="ctr"/>
+            <a:endParaRPr lang="en-CA"/>
+          </a:p>
+        </p:txBody>
+      </p:sp>
+      <p:pic>
+        <p:nvPicPr>
+          <p:cNvPr id="4100" name="Picture 4"/>
+          <p:cNvPicPr>
+            <a:picLocks noChangeAspect="1" noChangeArrowheads="1"/>
+          </p:cNvPicPr>
+          <p:nvPr/>
+        </p:nvPicPr>
+        <p:blipFill>
+          <a:blip r:embed="rId4">
+            <a:extLst>
+              <a:ext uri="{28A0092B-C50C-407E-A947-70E740481C1C}">
+                <a14:useLocalDpi xmlns:a14="http://schemas.microsoft.com/office/drawing/2010/main" val="0"/>
+              </a:ext>
+            </a:extLst>
+          </a:blip>
+          <a:srcRect/>
+          <a:stretch>
+            <a:fillRect/>
+          </a:stretch>
+        </p:blipFill>
+        <p:spPr bwMode="auto">
+          <a:xfrm>
+            <a:off x="723429" y="2057400"/>
+            <a:ext cx="7353771" cy="1978593"/>
+          </a:xfrm>
+          <a:prstGeom prst="rect">
+            <a:avLst/>
+          </a:prstGeom>
+          <a:noFill/>
+          <a:ln>
+            <a:noFill/>
+          </a:ln>
+          <a:extLst>
+            <a:ext uri="{909E8E84-426E-40DD-AFC4-6F175D3DCCD1}">
+              <a14:hiddenFill xmlns:a14="http://schemas.microsoft.com/office/drawing/2010/main">
+                <a:solidFill>
+                  <a:schemeClr val="accent1"/>
+                </a:solidFill>
+              </a14:hiddenFill>
+            </a:ext>
+            <a:ext uri="{91240B29-F687-4F45-9708-019B960494DF}">
+              <a14:hiddenLine xmlns:a14="http://schemas.microsoft.com/office/drawing/2010/main" w="9525">
+                <a:solidFill>
+                  <a:schemeClr val="tx1"/>
+                </a:solidFill>
+                <a:miter lim="800000"/>
+                <a:headEnd/>
+                <a:tailEnd/>
+              </a14:hiddenLine>
+            </a:ext>
+          </a:extLst>
+        </p:spPr>
+      </p:pic>
+      <p:sp>
+        <p:nvSpPr>
+          <p:cNvPr id="6" name="Rectangle 5"/>
+          <p:cNvSpPr/>
+          <p:nvPr/>
+        </p:nvSpPr>
+        <p:spPr>
+          <a:xfrm>
+            <a:off x="723429" y="3046696"/>
+            <a:ext cx="6286971" cy="306104"/>
+          </a:xfrm>
+          <a:prstGeom prst="rect">
+            <a:avLst/>
+          </a:prstGeom>
+          <a:noFill/>
+          <a:ln>
+            <a:solidFill>
+              <a:srgbClr val="FF0000"/>
+            </a:solidFill>
+          </a:ln>
+        </p:spPr>
+        <p:style>
+          <a:lnRef idx="2">
+            <a:schemeClr val="accent1">
+              <a:shade val="50000"/>
+            </a:schemeClr>
+          </a:lnRef>
+          <a:fillRef idx="1">
+            <a:schemeClr val="accent1"/>
+          </a:fillRef>
+          <a:effectRef idx="0">
+            <a:schemeClr val="accent1"/>
+          </a:effectRef>
+          <a:fontRef idx="minor">
+            <a:schemeClr val="lt1"/>
+          </a:fontRef>
+        </p:style>
+        <p:txBody>
+          <a:bodyPr rtlCol="0" anchor="ctr"/>
+          <a:lstStyle/>
+          <a:p>
+            <a:pPr algn="ctr"/>
+            <a:endParaRPr lang="en-CA"/>
+          </a:p>
+        </p:txBody>
+      </p:sp>
+      <p:sp>
+        <p:nvSpPr>
+          <p:cNvPr id="7" name="Rectangle 6"/>
+          <p:cNvSpPr/>
+          <p:nvPr/>
+        </p:nvSpPr>
+        <p:spPr>
+          <a:xfrm>
+            <a:off x="723429" y="2113548"/>
+            <a:ext cx="7294415" cy="904774"/>
+          </a:xfrm>
+          <a:prstGeom prst="rect">
+            <a:avLst/>
+          </a:prstGeom>
+          <a:solidFill>
+            <a:schemeClr val="bg1">
+              <a:lumMod val="85000"/>
+              <a:alpha val="68000"/>
+            </a:schemeClr>
+          </a:solidFill>
+          <a:ln>
+            <a:noFill/>
+          </a:ln>
+        </p:spPr>
+        <p:style>
+          <a:lnRef idx="2">
+            <a:schemeClr val="accent1">
+              <a:shade val="50000"/>
+            </a:schemeClr>
+          </a:lnRef>
+          <a:fillRef idx="1">
+            <a:schemeClr val="accent1"/>
+          </a:fillRef>
+          <a:effectRef idx="0">
+            <a:schemeClr val="accent1"/>
+          </a:effectRef>
+          <a:fontRef idx="minor">
+            <a:schemeClr val="lt1"/>
+          </a:fontRef>
+        </p:style>
+        <p:txBody>
+          <a:bodyPr rtlCol="0" anchor="ctr"/>
+          <a:lstStyle/>
+          <a:p>
+            <a:pPr algn="ctr"/>
+            <a:endParaRPr lang="en-CA"/>
+          </a:p>
+        </p:txBody>
+      </p:sp>
+      <p:sp>
+        <p:nvSpPr>
+          <p:cNvPr id="11" name="Rectangle 10"/>
+          <p:cNvSpPr/>
+          <p:nvPr/>
+        </p:nvSpPr>
+        <p:spPr>
+          <a:xfrm>
+            <a:off x="713804" y="3362425"/>
+            <a:ext cx="7294415" cy="904774"/>
+          </a:xfrm>
+          <a:prstGeom prst="rect">
+            <a:avLst/>
+          </a:prstGeom>
+          <a:solidFill>
+            <a:schemeClr val="bg1">
+              <a:lumMod val="85000"/>
+              <a:alpha val="68000"/>
+            </a:schemeClr>
+          </a:solidFill>
+          <a:ln>
+            <a:noFill/>
+          </a:ln>
+        </p:spPr>
+        <p:style>
+          <a:lnRef idx="2">
+            <a:schemeClr val="accent1">
+              <a:shade val="50000"/>
+            </a:schemeClr>
+          </a:lnRef>
+          <a:fillRef idx="1">
+            <a:schemeClr val="accent1"/>
+          </a:fillRef>
+          <a:effectRef idx="0">
+            <a:schemeClr val="accent1"/>
+          </a:effectRef>
+          <a:fontRef idx="minor">
+            <a:schemeClr val="lt1"/>
+          </a:fontRef>
+        </p:style>
+        <p:txBody>
+          <a:bodyPr rtlCol="0" anchor="ctr"/>
+          <a:lstStyle/>
+          <a:p>
+            <a:pPr algn="ctr"/>
+            <a:endParaRPr lang="en-CA"/>
+          </a:p>
+        </p:txBody>
+      </p:sp>
+      <p:sp>
+        <p:nvSpPr>
+          <p:cNvPr id="12" name="Content Placeholder 2"/>
+          <p:cNvSpPr txBox="1">
+            <a:spLocks/>
+          </p:cNvSpPr>
+          <p:nvPr/>
+        </p:nvSpPr>
+        <p:spPr bwMode="auto">
+          <a:xfrm>
+            <a:off x="457200" y="4648200"/>
+            <a:ext cx="8229600" cy="914400"/>
+          </a:xfrm>
+          <a:prstGeom prst="rect">
+            <a:avLst/>
+          </a:prstGeom>
+          <a:noFill/>
+          <a:ln>
+            <a:noFill/>
+          </a:ln>
+          <a:extLst>
+            <a:ext uri="{909E8E84-426E-40DD-AFC4-6F175D3DCCD1}">
+              <a14:hiddenFill xmlns:a14="http://schemas.microsoft.com/office/drawing/2010/main">
+                <a:solidFill>
+                  <a:srgbClr val="FFFFFF"/>
+                </a:solidFill>
+              </a14:hiddenFill>
+            </a:ext>
+            <a:ext uri="{91240B29-F687-4F45-9708-019B960494DF}">
+              <a14:hiddenLine xmlns:a14="http://schemas.microsoft.com/office/drawing/2010/main" w="9525">
+                <a:solidFill>
+                  <a:srgbClr val="000000"/>
+                </a:solidFill>
+                <a:miter lim="800000"/>
+                <a:headEnd/>
+                <a:tailEnd/>
+              </a14:hiddenLine>
+            </a:ext>
+          </a:extLst>
+        </p:spPr>
+        <p:txBody>
+          <a:bodyPr vert="horz" wrap="square" lIns="91440" tIns="45720" rIns="91440" bIns="45720" numCol="1" anchor="t" anchorCtr="0" compatLnSpc="1">
+            <a:prstTxWarp prst="textNoShape">
+              <a:avLst/>
+            </a:prstTxWarp>
+          </a:bodyPr>
+          <a:lstStyle>
+            <a:lvl1pPr marL="342900" indent="-342900" algn="l" rtl="0" eaLnBrk="1" fontAlgn="base" hangingPunct="1">
+              <a:spcBef>
+                <a:spcPct val="20000"/>
+              </a:spcBef>
+              <a:spcAft>
+                <a:spcPct val="0"/>
+              </a:spcAft>
+              <a:buChar char="•"/>
+              <a:defRPr sz="3200">
+                <a:solidFill>
+                  <a:schemeClr val="tx1"/>
+                </a:solidFill>
+                <a:latin typeface="+mn-lt"/>
+                <a:ea typeface="+mn-ea"/>
+                <a:cs typeface="+mn-cs"/>
+              </a:defRPr>
+            </a:lvl1pPr>
+            <a:lvl2pPr marL="742950" indent="-285750" algn="l" rtl="0" eaLnBrk="1" fontAlgn="base" hangingPunct="1">
+              <a:spcBef>
+                <a:spcPct val="20000"/>
+              </a:spcBef>
+              <a:spcAft>
+                <a:spcPct val="0"/>
+              </a:spcAft>
+              <a:buChar char="–"/>
+              <a:defRPr sz="2800">
+                <a:solidFill>
+                  <a:schemeClr val="tx1"/>
+                </a:solidFill>
+                <a:latin typeface="+mn-lt"/>
+              </a:defRPr>
+            </a:lvl2pPr>
+            <a:lvl3pPr marL="1143000" indent="-228600" algn="l" rtl="0" eaLnBrk="1" fontAlgn="base" hangingPunct="1">
+              <a:spcBef>
+                <a:spcPct val="20000"/>
+              </a:spcBef>
+              <a:spcAft>
+                <a:spcPct val="0"/>
+              </a:spcAft>
+              <a:buChar char="•"/>
+              <a:defRPr sz="2400">
+                <a:solidFill>
+                  <a:schemeClr val="tx1"/>
+                </a:solidFill>
+                <a:latin typeface="+mn-lt"/>
+              </a:defRPr>
+            </a:lvl3pPr>
+            <a:lvl4pPr marL="1600200" indent="-228600" algn="l" rtl="0" eaLnBrk="1" fontAlgn="base" hangingPunct="1">
+              <a:spcBef>
+                <a:spcPct val="20000"/>
+              </a:spcBef>
+              <a:spcAft>
+                <a:spcPct val="0"/>
+              </a:spcAft>
+              <a:buChar char="–"/>
+              <a:defRPr sz="2000">
+                <a:solidFill>
+                  <a:schemeClr val="tx1"/>
+                </a:solidFill>
+                <a:latin typeface="+mn-lt"/>
+              </a:defRPr>
+            </a:lvl4pPr>
+            <a:lvl5pPr marL="2057400" indent="-228600" algn="l" rtl="0" eaLnBrk="1" fontAlgn="base" hangingPunct="1">
+              <a:spcBef>
+                <a:spcPct val="20000"/>
+              </a:spcBef>
+              <a:spcAft>
+                <a:spcPct val="0"/>
+              </a:spcAft>
+              <a:buChar char="»"/>
+              <a:defRPr sz="2000">
+                <a:solidFill>
+                  <a:schemeClr val="tx1"/>
+                </a:solidFill>
+                <a:latin typeface="+mn-lt"/>
+              </a:defRPr>
+            </a:lvl5pPr>
+            <a:lvl6pPr marL="2514600" indent="-228600" algn="l" rtl="0" eaLnBrk="1" fontAlgn="base" hangingPunct="1">
+              <a:spcBef>
+                <a:spcPct val="20000"/>
+              </a:spcBef>
+              <a:spcAft>
+                <a:spcPct val="0"/>
+              </a:spcAft>
+              <a:buChar char="»"/>
+              <a:defRPr sz="2000">
+                <a:solidFill>
+                  <a:schemeClr val="tx1"/>
+                </a:solidFill>
+                <a:latin typeface="+mn-lt"/>
+              </a:defRPr>
+            </a:lvl6pPr>
+            <a:lvl7pPr marL="2971800" indent="-228600" algn="l" rtl="0" eaLnBrk="1" fontAlgn="base" hangingPunct="1">
+              <a:spcBef>
+                <a:spcPct val="20000"/>
+              </a:spcBef>
+              <a:spcAft>
+                <a:spcPct val="0"/>
+              </a:spcAft>
+              <a:buChar char="»"/>
+              <a:defRPr sz="2000">
+                <a:solidFill>
+                  <a:schemeClr val="tx1"/>
+                </a:solidFill>
+                <a:latin typeface="+mn-lt"/>
+              </a:defRPr>
+            </a:lvl7pPr>
+            <a:lvl8pPr marL="3429000" indent="-228600" algn="l" rtl="0" eaLnBrk="1" fontAlgn="base" hangingPunct="1">
+              <a:spcBef>
+                <a:spcPct val="20000"/>
+              </a:spcBef>
+              <a:spcAft>
+                <a:spcPct val="0"/>
+              </a:spcAft>
+              <a:buChar char="»"/>
+              <a:defRPr sz="2000">
+                <a:solidFill>
+                  <a:schemeClr val="tx1"/>
+                </a:solidFill>
+                <a:latin typeface="+mn-lt"/>
+              </a:defRPr>
+            </a:lvl8pPr>
+            <a:lvl9pPr marL="3886200" indent="-228600" algn="l" rtl="0" eaLnBrk="1" fontAlgn="base" hangingPunct="1">
+              <a:spcBef>
+                <a:spcPct val="20000"/>
+              </a:spcBef>
+              <a:spcAft>
+                <a:spcPct val="0"/>
+              </a:spcAft>
+              <a:buChar char="»"/>
+              <a:defRPr sz="2000">
+                <a:solidFill>
+                  <a:schemeClr val="tx1"/>
+                </a:solidFill>
+                <a:latin typeface="+mn-lt"/>
+              </a:defRPr>
+            </a:lvl9pPr>
+          </a:lstStyle>
+          <a:p>
+            <a:r>
+              <a:rPr lang="en-CA" sz="2400" kern="0" dirty="0" smtClean="0"/>
+              <a:t>Each </a:t>
+            </a:r>
+            <a:r>
+              <a:rPr lang="en-CA" sz="2400" b="1" i="1" kern="0" dirty="0" smtClean="0"/>
+              <a:t>row profile</a:t>
+            </a:r>
+            <a:r>
+              <a:rPr lang="en-CA" sz="2400" kern="0" dirty="0" smtClean="0"/>
+              <a:t> is a point in 4D space</a:t>
+            </a:r>
+          </a:p>
+          <a:p>
+            <a:r>
+              <a:rPr lang="en-CA" sz="2400" kern="0" dirty="0" smtClean="0"/>
+              <a:t>How do we display this in a 2D scatterplot? </a:t>
+            </a:r>
+            <a:endParaRPr lang="en-CA" sz="2400" kern="0" dirty="0" smtClean="0"/>
           </a:p>
         </p:txBody>
       </p:sp>
@@ -5565,9 +7533,380 @@
   <p:timing>
     <p:tnLst>
       <p:par>
-        <p:cTn id="1" dur="indefinite" restart="never" nodeType="tmRoot"/>
+        <p:cTn id="1" dur="indefinite" restart="never" nodeType="tmRoot">
+          <p:childTnLst>
+            <p:seq concurrent="1" nextAc="seek">
+              <p:cTn id="2" dur="indefinite" nodeType="mainSeq">
+                <p:childTnLst>
+                  <p:par>
+                    <p:cTn id="3" fill="hold">
+                      <p:stCondLst>
+                        <p:cond delay="indefinite"/>
+                      </p:stCondLst>
+                      <p:childTnLst>
+                        <p:par>
+                          <p:cTn id="4" fill="hold">
+                            <p:stCondLst>
+                              <p:cond delay="0"/>
+                            </p:stCondLst>
+                            <p:childTnLst>
+                              <p:par>
+                                <p:cTn id="5" presetID="1" presetClass="entr" presetSubtype="0" fill="hold" nodeType="clickEffect">
+                                  <p:stCondLst>
+                                    <p:cond delay="0"/>
+                                  </p:stCondLst>
+                                  <p:childTnLst>
+                                    <p:set>
+                                      <p:cBhvr>
+                                        <p:cTn id="6" dur="1" fill="hold">
+                                          <p:stCondLst>
+                                            <p:cond delay="0"/>
+                                          </p:stCondLst>
+                                        </p:cTn>
+                                        <p:tgtEl>
+                                          <p:spTgt spid="4099"/>
+                                        </p:tgtEl>
+                                        <p:attrNameLst>
+                                          <p:attrName>style.visibility</p:attrName>
+                                        </p:attrNameLst>
+                                      </p:cBhvr>
+                                      <p:to>
+                                        <p:strVal val="visible"/>
+                                      </p:to>
+                                    </p:set>
+                                  </p:childTnLst>
+                                </p:cTn>
+                              </p:par>
+                              <p:par>
+                                <p:cTn id="7" presetID="1" presetClass="entr" presetSubtype="0" fill="hold" grpId="0" nodeType="withEffect">
+                                  <p:stCondLst>
+                                    <p:cond delay="0"/>
+                                  </p:stCondLst>
+                                  <p:childTnLst>
+                                    <p:set>
+                                      <p:cBhvr>
+                                        <p:cTn id="8" dur="1" fill="hold">
+                                          <p:stCondLst>
+                                            <p:cond delay="0"/>
+                                          </p:stCondLst>
+                                        </p:cTn>
+                                        <p:tgtEl>
+                                          <p:spTgt spid="4"/>
+                                        </p:tgtEl>
+                                        <p:attrNameLst>
+                                          <p:attrName>style.visibility</p:attrName>
+                                        </p:attrNameLst>
+                                      </p:cBhvr>
+                                      <p:to>
+                                        <p:strVal val="visible"/>
+                                      </p:to>
+                                    </p:set>
+                                  </p:childTnLst>
+                                </p:cTn>
+                              </p:par>
+                            </p:childTnLst>
+                          </p:cTn>
+                        </p:par>
+                      </p:childTnLst>
+                    </p:cTn>
+                  </p:par>
+                  <p:par>
+                    <p:cTn id="9" fill="hold">
+                      <p:stCondLst>
+                        <p:cond delay="indefinite"/>
+                      </p:stCondLst>
+                      <p:childTnLst>
+                        <p:par>
+                          <p:cTn id="10" fill="hold">
+                            <p:stCondLst>
+                              <p:cond delay="0"/>
+                            </p:stCondLst>
+                            <p:childTnLst>
+                              <p:par>
+                                <p:cTn id="11" presetID="1" presetClass="entr" presetSubtype="0" fill="hold" nodeType="clickEffect">
+                                  <p:stCondLst>
+                                    <p:cond delay="0"/>
+                                  </p:stCondLst>
+                                  <p:childTnLst>
+                                    <p:set>
+                                      <p:cBhvr>
+                                        <p:cTn id="12" dur="1" fill="hold">
+                                          <p:stCondLst>
+                                            <p:cond delay="0"/>
+                                          </p:stCondLst>
+                                        </p:cTn>
+                                        <p:tgtEl>
+                                          <p:spTgt spid="4100"/>
+                                        </p:tgtEl>
+                                        <p:attrNameLst>
+                                          <p:attrName>style.visibility</p:attrName>
+                                        </p:attrNameLst>
+                                      </p:cBhvr>
+                                      <p:to>
+                                        <p:strVal val="visible"/>
+                                      </p:to>
+                                    </p:set>
+                                  </p:childTnLst>
+                                </p:cTn>
+                              </p:par>
+                              <p:par>
+                                <p:cTn id="13" presetID="1" presetClass="exit" presetSubtype="0" fill="hold" grpId="1" nodeType="withEffect">
+                                  <p:stCondLst>
+                                    <p:cond delay="0"/>
+                                  </p:stCondLst>
+                                  <p:childTnLst>
+                                    <p:set>
+                                      <p:cBhvr>
+                                        <p:cTn id="14" dur="1" fill="hold">
+                                          <p:stCondLst>
+                                            <p:cond delay="0"/>
+                                          </p:stCondLst>
+                                        </p:cTn>
+                                        <p:tgtEl>
+                                          <p:spTgt spid="4"/>
+                                        </p:tgtEl>
+                                        <p:attrNameLst>
+                                          <p:attrName>style.visibility</p:attrName>
+                                        </p:attrNameLst>
+                                      </p:cBhvr>
+                                      <p:to>
+                                        <p:strVal val="hidden"/>
+                                      </p:to>
+                                    </p:set>
+                                  </p:childTnLst>
+                                </p:cTn>
+                              </p:par>
+                            </p:childTnLst>
+                          </p:cTn>
+                        </p:par>
+                      </p:childTnLst>
+                    </p:cTn>
+                  </p:par>
+                  <p:par>
+                    <p:cTn id="15" fill="hold">
+                      <p:stCondLst>
+                        <p:cond delay="indefinite"/>
+                      </p:stCondLst>
+                      <p:childTnLst>
+                        <p:par>
+                          <p:cTn id="16" fill="hold">
+                            <p:stCondLst>
+                              <p:cond delay="0"/>
+                            </p:stCondLst>
+                            <p:childTnLst>
+                              <p:par>
+                                <p:cTn id="17" presetID="1" presetClass="entr" presetSubtype="0" fill="hold" grpId="0" nodeType="clickEffect">
+                                  <p:stCondLst>
+                                    <p:cond delay="0"/>
+                                  </p:stCondLst>
+                                  <p:childTnLst>
+                                    <p:set>
+                                      <p:cBhvr>
+                                        <p:cTn id="18" dur="1" fill="hold">
+                                          <p:stCondLst>
+                                            <p:cond delay="0"/>
+                                          </p:stCondLst>
+                                        </p:cTn>
+                                        <p:tgtEl>
+                                          <p:spTgt spid="6"/>
+                                        </p:tgtEl>
+                                        <p:attrNameLst>
+                                          <p:attrName>style.visibility</p:attrName>
+                                        </p:attrNameLst>
+                                      </p:cBhvr>
+                                      <p:to>
+                                        <p:strVal val="visible"/>
+                                      </p:to>
+                                    </p:set>
+                                  </p:childTnLst>
+                                </p:cTn>
+                              </p:par>
+                              <p:par>
+                                <p:cTn id="19" presetID="1" presetClass="entr" presetSubtype="0" fill="hold" grpId="0" nodeType="withEffect">
+                                  <p:stCondLst>
+                                    <p:cond delay="0"/>
+                                  </p:stCondLst>
+                                  <p:childTnLst>
+                                    <p:set>
+                                      <p:cBhvr>
+                                        <p:cTn id="20" dur="1" fill="hold">
+                                          <p:stCondLst>
+                                            <p:cond delay="0"/>
+                                          </p:stCondLst>
+                                        </p:cTn>
+                                        <p:tgtEl>
+                                          <p:spTgt spid="11"/>
+                                        </p:tgtEl>
+                                        <p:attrNameLst>
+                                          <p:attrName>style.visibility</p:attrName>
+                                        </p:attrNameLst>
+                                      </p:cBhvr>
+                                      <p:to>
+                                        <p:strVal val="visible"/>
+                                      </p:to>
+                                    </p:set>
+                                  </p:childTnLst>
+                                </p:cTn>
+                              </p:par>
+                              <p:par>
+                                <p:cTn id="21" presetID="1" presetClass="entr" presetSubtype="0" fill="hold" grpId="0" nodeType="withEffect">
+                                  <p:stCondLst>
+                                    <p:cond delay="0"/>
+                                  </p:stCondLst>
+                                  <p:childTnLst>
+                                    <p:set>
+                                      <p:cBhvr>
+                                        <p:cTn id="22" dur="1" fill="hold">
+                                          <p:stCondLst>
+                                            <p:cond delay="0"/>
+                                          </p:stCondLst>
+                                        </p:cTn>
+                                        <p:tgtEl>
+                                          <p:spTgt spid="7"/>
+                                        </p:tgtEl>
+                                        <p:attrNameLst>
+                                          <p:attrName>style.visibility</p:attrName>
+                                        </p:attrNameLst>
+                                      </p:cBhvr>
+                                      <p:to>
+                                        <p:strVal val="visible"/>
+                                      </p:to>
+                                    </p:set>
+                                  </p:childTnLst>
+                                </p:cTn>
+                              </p:par>
+                            </p:childTnLst>
+                          </p:cTn>
+                        </p:par>
+                      </p:childTnLst>
+                    </p:cTn>
+                  </p:par>
+                  <p:par>
+                    <p:cTn id="23" fill="hold">
+                      <p:stCondLst>
+                        <p:cond delay="indefinite"/>
+                      </p:stCondLst>
+                      <p:childTnLst>
+                        <p:par>
+                          <p:cTn id="24" fill="hold">
+                            <p:stCondLst>
+                              <p:cond delay="0"/>
+                            </p:stCondLst>
+                            <p:childTnLst>
+                              <p:par>
+                                <p:cTn id="25" presetID="1" presetClass="entr" presetSubtype="0" fill="hold" nodeType="clickEffect">
+                                  <p:stCondLst>
+                                    <p:cond delay="0"/>
+                                  </p:stCondLst>
+                                  <p:childTnLst>
+                                    <p:set>
+                                      <p:cBhvr>
+                                        <p:cTn id="26" dur="1" fill="hold">
+                                          <p:stCondLst>
+                                            <p:cond delay="0"/>
+                                          </p:stCondLst>
+                                        </p:cTn>
+                                        <p:tgtEl>
+                                          <p:spTgt spid="12">
+                                            <p:txEl>
+                                              <p:pRg st="0" end="0"/>
+                                            </p:txEl>
+                                          </p:spTgt>
+                                        </p:tgtEl>
+                                        <p:attrNameLst>
+                                          <p:attrName>style.visibility</p:attrName>
+                                        </p:attrNameLst>
+                                      </p:cBhvr>
+                                      <p:to>
+                                        <p:strVal val="visible"/>
+                                      </p:to>
+                                    </p:set>
+                                  </p:childTnLst>
+                                </p:cTn>
+                              </p:par>
+                            </p:childTnLst>
+                          </p:cTn>
+                        </p:par>
+                      </p:childTnLst>
+                    </p:cTn>
+                  </p:par>
+                  <p:par>
+                    <p:cTn id="27" fill="hold">
+                      <p:stCondLst>
+                        <p:cond delay="indefinite"/>
+                      </p:stCondLst>
+                      <p:childTnLst>
+                        <p:par>
+                          <p:cTn id="28" fill="hold">
+                            <p:stCondLst>
+                              <p:cond delay="0"/>
+                            </p:stCondLst>
+                            <p:childTnLst>
+                              <p:par>
+                                <p:cTn id="29" presetID="1" presetClass="entr" presetSubtype="0" fill="hold" nodeType="clickEffect">
+                                  <p:stCondLst>
+                                    <p:cond delay="0"/>
+                                  </p:stCondLst>
+                                  <p:childTnLst>
+                                    <p:set>
+                                      <p:cBhvr>
+                                        <p:cTn id="30" dur="1" fill="hold">
+                                          <p:stCondLst>
+                                            <p:cond delay="0"/>
+                                          </p:stCondLst>
+                                        </p:cTn>
+                                        <p:tgtEl>
+                                          <p:spTgt spid="12">
+                                            <p:txEl>
+                                              <p:pRg st="1" end="1"/>
+                                            </p:txEl>
+                                          </p:spTgt>
+                                        </p:tgtEl>
+                                        <p:attrNameLst>
+                                          <p:attrName>style.visibility</p:attrName>
+                                        </p:attrNameLst>
+                                      </p:cBhvr>
+                                      <p:to>
+                                        <p:strVal val="visible"/>
+                                      </p:to>
+                                    </p:set>
+                                  </p:childTnLst>
+                                </p:cTn>
+                              </p:par>
+                            </p:childTnLst>
+                          </p:cTn>
+                        </p:par>
+                      </p:childTnLst>
+                    </p:cTn>
+                  </p:par>
+                </p:childTnLst>
+              </p:cTn>
+              <p:prevCondLst>
+                <p:cond evt="onPrev" delay="0">
+                  <p:tgtEl>
+                    <p:sldTgt/>
+                  </p:tgtEl>
+                </p:cond>
+              </p:prevCondLst>
+              <p:nextCondLst>
+                <p:cond evt="onNext" delay="0">
+                  <p:tgtEl>
+                    <p:sldTgt/>
+                  </p:tgtEl>
+                </p:cond>
+              </p:nextCondLst>
+            </p:seq>
+          </p:childTnLst>
+        </p:cTn>
       </p:par>
     </p:tnLst>
+    <p:bldLst>
+      <p:bldP spid="4" grpId="0" animBg="1"/>
+      <p:bldP spid="4" grpId="1" animBg="1"/>
+      <p:bldP spid="6" grpId="0" animBg="1"/>
+      <p:bldP spid="7" grpId="0" animBg="1"/>
+      <p:bldP spid="11" grpId="0" animBg="1"/>
+    </p:bldLst>
   </p:timing>
 </p:sld>
 </file>
@@ -5628,6 +7967,10 @@
           <a:bodyPr/>
           <a:lstStyle/>
           <a:p>
+            <a:r>
+              <a:rPr lang="en-CA" sz="2400" dirty="0" smtClean="0"/>
+              <a:t>d</a:t>
+            </a:r>
             <a:endParaRPr lang="en-CA" sz="2400" dirty="0" smtClean="0"/>
           </a:p>
         </p:txBody>
@@ -6448,4 +8791,289 @@
     </a:extraClrScheme>
   </a:extraClrSchemeLst>
 </a:theme>
+</file>
+
+<file path=ppt/theme/theme2.xml><?xml version="1.0" encoding="utf-8"?>
+<a:theme xmlns:a="http://schemas.openxmlformats.org/drawingml/2006/main" name="Office Theme">
+  <a:themeElements>
+    <a:clrScheme name="Office">
+      <a:dk1>
+        <a:sysClr val="windowText" lastClr="000000"/>
+      </a:dk1>
+      <a:lt1>
+        <a:sysClr val="window" lastClr="FFFFFF"/>
+      </a:lt1>
+      <a:dk2>
+        <a:srgbClr val="1F497D"/>
+      </a:dk2>
+      <a:lt2>
+        <a:srgbClr val="EEECE1"/>
+      </a:lt2>
+      <a:accent1>
+        <a:srgbClr val="4F81BD"/>
+      </a:accent1>
+      <a:accent2>
+        <a:srgbClr val="C0504D"/>
+      </a:accent2>
+      <a:accent3>
+        <a:srgbClr val="9BBB59"/>
+      </a:accent3>
+      <a:accent4>
+        <a:srgbClr val="8064A2"/>
+      </a:accent4>
+      <a:accent5>
+        <a:srgbClr val="4BACC6"/>
+      </a:accent5>
+      <a:accent6>
+        <a:srgbClr val="F79646"/>
+      </a:accent6>
+      <a:hlink>
+        <a:srgbClr val="0000FF"/>
+      </a:hlink>
+      <a:folHlink>
+        <a:srgbClr val="800080"/>
+      </a:folHlink>
+    </a:clrScheme>
+    <a:fontScheme name="Office">
+      <a:majorFont>
+        <a:latin typeface="Calibri"/>
+        <a:ea typeface=""/>
+        <a:cs typeface=""/>
+        <a:font script="Jpan" typeface="ＭＳ Ｐゴシック"/>
+        <a:font script="Hang" typeface="맑은 고딕"/>
+        <a:font script="Hans" typeface="宋体"/>
+        <a:font script="Hant" typeface="新細明體"/>
+        <a:font script="Arab" typeface="Times New Roman"/>
+        <a:font script="Hebr" typeface="Times New Roman"/>
+        <a:font script="Thai" typeface="Angsana New"/>
+        <a:font script="Ethi" typeface="Nyala"/>
+        <a:font script="Beng" typeface="Vrinda"/>
+        <a:font script="Gujr" typeface="Shruti"/>
+        <a:font script="Khmr" typeface="MoolBoran"/>
+        <a:font script="Knda" typeface="Tunga"/>
+        <a:font script="Guru" typeface="Raavi"/>
+        <a:font script="Cans" typeface="Euphemia"/>
+        <a:font script="Cher" typeface="Plantagenet Cherokee"/>
+        <a:font script="Yiii" typeface="Microsoft Yi Baiti"/>
+        <a:font script="Tibt" typeface="Microsoft Himalaya"/>
+        <a:font script="Thaa" typeface="MV Boli"/>
+        <a:font script="Deva" typeface="Mangal"/>
+        <a:font script="Telu" typeface="Gautami"/>
+        <a:font script="Taml" typeface="Latha"/>
+        <a:font script="Syrc" typeface="Estrangelo Edessa"/>
+        <a:font script="Orya" typeface="Kalinga"/>
+        <a:font script="Mlym" typeface="Kartika"/>
+        <a:font script="Laoo" typeface="DokChampa"/>
+        <a:font script="Sinh" typeface="Iskoola Pota"/>
+        <a:font script="Mong" typeface="Mongolian Baiti"/>
+        <a:font script="Viet" typeface="Times New Roman"/>
+        <a:font script="Uigh" typeface="Microsoft Uighur"/>
+        <a:font script="Geor" typeface="Sylfaen"/>
+      </a:majorFont>
+      <a:minorFont>
+        <a:latin typeface="Calibri"/>
+        <a:ea typeface=""/>
+        <a:cs typeface=""/>
+        <a:font script="Jpan" typeface="ＭＳ Ｐゴシック"/>
+        <a:font script="Hang" typeface="맑은 고딕"/>
+        <a:font script="Hans" typeface="宋体"/>
+        <a:font script="Hant" typeface="新細明體"/>
+        <a:font script="Arab" typeface="Arial"/>
+        <a:font script="Hebr" typeface="Arial"/>
+        <a:font script="Thai" typeface="Cordia New"/>
+        <a:font script="Ethi" typeface="Nyala"/>
+        <a:font script="Beng" typeface="Vrinda"/>
+        <a:font script="Gujr" typeface="Shruti"/>
+        <a:font script="Khmr" typeface="DaunPenh"/>
+        <a:font script="Knda" typeface="Tunga"/>
+        <a:font script="Guru" typeface="Raavi"/>
+        <a:font script="Cans" typeface="Euphemia"/>
+        <a:font script="Cher" typeface="Plantagenet Cherokee"/>
+        <a:font script="Yiii" typeface="Microsoft Yi Baiti"/>
+        <a:font script="Tibt" typeface="Microsoft Himalaya"/>
+        <a:font script="Thaa" typeface="MV Boli"/>
+        <a:font script="Deva" typeface="Mangal"/>
+        <a:font script="Telu" typeface="Gautami"/>
+        <a:font script="Taml" typeface="Latha"/>
+        <a:font script="Syrc" typeface="Estrangelo Edessa"/>
+        <a:font script="Orya" typeface="Kalinga"/>
+        <a:font script="Mlym" typeface="Kartika"/>
+        <a:font script="Laoo" typeface="DokChampa"/>
+        <a:font script="Sinh" typeface="Iskoola Pota"/>
+        <a:font script="Mong" typeface="Mongolian Baiti"/>
+        <a:font script="Viet" typeface="Arial"/>
+        <a:font script="Uigh" typeface="Microsoft Uighur"/>
+        <a:font script="Geor" typeface="Sylfaen"/>
+      </a:minorFont>
+    </a:fontScheme>
+    <a:fmtScheme name="Office">
+      <a:fillStyleLst>
+        <a:solidFill>
+          <a:schemeClr val="phClr"/>
+        </a:solidFill>
+        <a:gradFill rotWithShape="1">
+          <a:gsLst>
+            <a:gs pos="0">
+              <a:schemeClr val="phClr">
+                <a:tint val="50000"/>
+                <a:satMod val="300000"/>
+              </a:schemeClr>
+            </a:gs>
+            <a:gs pos="35000">
+              <a:schemeClr val="phClr">
+                <a:tint val="37000"/>
+                <a:satMod val="300000"/>
+              </a:schemeClr>
+            </a:gs>
+            <a:gs pos="100000">
+              <a:schemeClr val="phClr">
+                <a:tint val="15000"/>
+                <a:satMod val="350000"/>
+              </a:schemeClr>
+            </a:gs>
+          </a:gsLst>
+          <a:lin ang="16200000" scaled="1"/>
+        </a:gradFill>
+        <a:gradFill rotWithShape="1">
+          <a:gsLst>
+            <a:gs pos="0">
+              <a:schemeClr val="phClr">
+                <a:shade val="51000"/>
+                <a:satMod val="130000"/>
+              </a:schemeClr>
+            </a:gs>
+            <a:gs pos="80000">
+              <a:schemeClr val="phClr">
+                <a:shade val="93000"/>
+                <a:satMod val="130000"/>
+              </a:schemeClr>
+            </a:gs>
+            <a:gs pos="100000">
+              <a:schemeClr val="phClr">
+                <a:shade val="94000"/>
+                <a:satMod val="135000"/>
+              </a:schemeClr>
+            </a:gs>
+          </a:gsLst>
+          <a:lin ang="16200000" scaled="0"/>
+        </a:gradFill>
+      </a:fillStyleLst>
+      <a:lnStyleLst>
+        <a:ln w="9525" cap="flat" cmpd="sng" algn="ctr">
+          <a:solidFill>
+            <a:schemeClr val="phClr">
+              <a:shade val="95000"/>
+              <a:satMod val="105000"/>
+            </a:schemeClr>
+          </a:solidFill>
+          <a:prstDash val="solid"/>
+        </a:ln>
+        <a:ln w="25400" cap="flat" cmpd="sng" algn="ctr">
+          <a:solidFill>
+            <a:schemeClr val="phClr"/>
+          </a:solidFill>
+          <a:prstDash val="solid"/>
+        </a:ln>
+        <a:ln w="38100" cap="flat" cmpd="sng" algn="ctr">
+          <a:solidFill>
+            <a:schemeClr val="phClr"/>
+          </a:solidFill>
+          <a:prstDash val="solid"/>
+        </a:ln>
+      </a:lnStyleLst>
+      <a:effectStyleLst>
+        <a:effectStyle>
+          <a:effectLst>
+            <a:outerShdw blurRad="40000" dist="20000" dir="5400000" rotWithShape="0">
+              <a:srgbClr val="000000">
+                <a:alpha val="38000"/>
+              </a:srgbClr>
+            </a:outerShdw>
+          </a:effectLst>
+        </a:effectStyle>
+        <a:effectStyle>
+          <a:effectLst>
+            <a:outerShdw blurRad="40000" dist="23000" dir="5400000" rotWithShape="0">
+              <a:srgbClr val="000000">
+                <a:alpha val="35000"/>
+              </a:srgbClr>
+            </a:outerShdw>
+          </a:effectLst>
+        </a:effectStyle>
+        <a:effectStyle>
+          <a:effectLst>
+            <a:outerShdw blurRad="40000" dist="23000" dir="5400000" rotWithShape="0">
+              <a:srgbClr val="000000">
+                <a:alpha val="35000"/>
+              </a:srgbClr>
+            </a:outerShdw>
+          </a:effectLst>
+          <a:scene3d>
+            <a:camera prst="orthographicFront">
+              <a:rot lat="0" lon="0" rev="0"/>
+            </a:camera>
+            <a:lightRig rig="threePt" dir="t">
+              <a:rot lat="0" lon="0" rev="1200000"/>
+            </a:lightRig>
+          </a:scene3d>
+          <a:sp3d>
+            <a:bevelT w="63500" h="25400"/>
+          </a:sp3d>
+        </a:effectStyle>
+      </a:effectStyleLst>
+      <a:bgFillStyleLst>
+        <a:solidFill>
+          <a:schemeClr val="phClr"/>
+        </a:solidFill>
+        <a:gradFill rotWithShape="1">
+          <a:gsLst>
+            <a:gs pos="0">
+              <a:schemeClr val="phClr">
+                <a:tint val="40000"/>
+                <a:satMod val="350000"/>
+              </a:schemeClr>
+            </a:gs>
+            <a:gs pos="40000">
+              <a:schemeClr val="phClr">
+                <a:tint val="45000"/>
+                <a:shade val="99000"/>
+                <a:satMod val="350000"/>
+              </a:schemeClr>
+            </a:gs>
+            <a:gs pos="100000">
+              <a:schemeClr val="phClr">
+                <a:shade val="20000"/>
+                <a:satMod val="255000"/>
+              </a:schemeClr>
+            </a:gs>
+          </a:gsLst>
+          <a:path path="circle">
+            <a:fillToRect l="50000" t="-80000" r="50000" b="180000"/>
+          </a:path>
+        </a:gradFill>
+        <a:gradFill rotWithShape="1">
+          <a:gsLst>
+            <a:gs pos="0">
+              <a:schemeClr val="phClr">
+                <a:tint val="80000"/>
+                <a:satMod val="300000"/>
+              </a:schemeClr>
+            </a:gs>
+            <a:gs pos="100000">
+              <a:schemeClr val="phClr">
+                <a:shade val="30000"/>
+                <a:satMod val="200000"/>
+              </a:schemeClr>
+            </a:gs>
+          </a:gsLst>
+          <a:path path="circle">
+            <a:fillToRect l="50000" t="50000" r="50000" b="50000"/>
+          </a:path>
+        </a:gradFill>
+      </a:bgFillStyleLst>
+    </a:fmtScheme>
+  </a:themeElements>
+  <a:objectDefaults/>
+  <a:extraClrSchemeLst/>
+</a:theme>
 </file>
</xml_diff>

<commit_message>
skeleton up to slide 10
</commit_message>
<xml_diff>
--- a/results/2017-09-22_Correspondence-analysis-for-nursing-unit-similarity.pptx
+++ b/results/2017-09-22_Correspondence-analysis-for-nursing-unit-similarity.pptx
@@ -4395,34 +4395,57 @@
           <a:bodyPr/>
           <a:lstStyle/>
           <a:p>
+            <a:r>
+              <a:rPr lang="en-CA" dirty="0" smtClean="0"/>
+              <a:t>Results from smoking data </a:t>
+            </a:r>
             <a:endParaRPr lang="en-CA" dirty="0"/>
           </a:p>
         </p:txBody>
       </p:sp>
-      <p:sp>
-        <p:nvSpPr>
-          <p:cNvPr id="3" name="Content Placeholder 2"/>
-          <p:cNvSpPr>
-            <a:spLocks noGrp="1"/>
-          </p:cNvSpPr>
+      <p:pic>
+        <p:nvPicPr>
+          <p:cNvPr id="5122" name="Picture 2" descr="H:\VCH files - Nayef\2017.09.21 Exploring correspondence analysis\results\output from src\smoke_CA.jpeg"/>
+          <p:cNvPicPr>
+            <a:picLocks noGrp="1" noChangeAspect="1" noChangeArrowheads="1"/>
+          </p:cNvPicPr>
           <p:nvPr>
             <p:ph idx="1"/>
           </p:nvPr>
-        </p:nvSpPr>
-        <p:spPr>
+        </p:nvPicPr>
+        <p:blipFill>
+          <a:blip r:embed="rId2">
+            <a:extLst>
+              <a:ext uri="{28A0092B-C50C-407E-A947-70E740481C1C}">
+                <a14:useLocalDpi xmlns:a14="http://schemas.microsoft.com/office/drawing/2010/main" val="0"/>
+              </a:ext>
+            </a:extLst>
+          </a:blip>
+          <a:srcRect/>
+          <a:stretch>
+            <a:fillRect/>
+          </a:stretch>
+        </p:blipFill>
+        <p:spPr bwMode="auto">
           <a:xfrm>
-            <a:off x="457200" y="1295400"/>
-            <a:ext cx="8229600" cy="4525963"/>
+            <a:off x="1136867" y="1295400"/>
+            <a:ext cx="6870266" cy="4727248"/>
           </a:xfrm>
-        </p:spPr>
-        <p:txBody>
-          <a:bodyPr/>
-          <a:lstStyle/>
-          <a:p>
-            <a:endParaRPr lang="en-CA" sz="2400" dirty="0" smtClean="0"/>
-          </a:p>
-        </p:txBody>
-      </p:sp>
+          <a:prstGeom prst="rect">
+            <a:avLst/>
+          </a:prstGeom>
+          <a:noFill/>
+          <a:extLst>
+            <a:ext uri="{909E8E84-426E-40DD-AFC4-6F175D3DCCD1}">
+              <a14:hiddenFill xmlns:a14="http://schemas.microsoft.com/office/drawing/2010/main">
+                <a:solidFill>
+                  <a:srgbClr val="FFFFFF"/>
+                </a:solidFill>
+              </a14:hiddenFill>
+            </a:ext>
+          </a:extLst>
+        </p:spPr>
+      </p:pic>
     </p:spTree>
     <p:extLst>
       <p:ext uri="{BB962C8B-B14F-4D97-AF65-F5344CB8AC3E}">
@@ -7930,6 +7953,52 @@
       </p:grpSpPr>
       <p:sp>
         <p:nvSpPr>
+          <p:cNvPr id="5" name="Rectangle 4"/>
+          <p:cNvSpPr/>
+          <p:nvPr/>
+        </p:nvSpPr>
+        <p:spPr>
+          <a:xfrm>
+            <a:off x="-1" y="5973763"/>
+            <a:ext cx="2108735" cy="579437"/>
+          </a:xfrm>
+          <a:prstGeom prst="rect">
+            <a:avLst/>
+          </a:prstGeom>
+          <a:solidFill>
+            <a:schemeClr val="bg1"/>
+          </a:solidFill>
+          <a:ln>
+            <a:noFill/>
+          </a:ln>
+        </p:spPr>
+        <p:style>
+          <a:lnRef idx="2">
+            <a:schemeClr val="accent1">
+              <a:shade val="50000"/>
+            </a:schemeClr>
+          </a:lnRef>
+          <a:fillRef idx="1">
+            <a:schemeClr val="accent1"/>
+          </a:fillRef>
+          <a:effectRef idx="0">
+            <a:schemeClr val="accent1"/>
+          </a:effectRef>
+          <a:fontRef idx="minor">
+            <a:schemeClr val="lt1"/>
+          </a:fontRef>
+        </p:style>
+        <p:txBody>
+          <a:bodyPr rtlCol="0" anchor="ctr"/>
+          <a:lstStyle/>
+          <a:p>
+            <a:pPr algn="ctr"/>
+            <a:endParaRPr lang="en-CA"/>
+          </a:p>
+        </p:txBody>
+      </p:sp>
+      <p:sp>
+        <p:nvSpPr>
           <p:cNvPr id="2" name="Title 1"/>
           <p:cNvSpPr>
             <a:spLocks noGrp="1"/>
@@ -7943,6 +8012,10 @@
           <a:bodyPr/>
           <a:lstStyle/>
           <a:p>
+            <a:r>
+              <a:rPr lang="en-CA" dirty="0" smtClean="0"/>
+              <a:t>Squishing n-dimensional data onto 2D scatterplots</a:t>
+            </a:r>
             <a:endParaRPr lang="en-CA" dirty="0"/>
           </a:p>
         </p:txBody>
@@ -7959,19 +8032,106 @@
         </p:nvSpPr>
         <p:spPr>
           <a:xfrm>
-            <a:off x="457200" y="1295400"/>
-            <a:ext cx="8229600" cy="4525963"/>
+            <a:off x="457200" y="1676400"/>
+            <a:ext cx="8229600" cy="4144963"/>
           </a:xfrm>
         </p:spPr>
         <p:txBody>
           <a:bodyPr/>
           <a:lstStyle/>
           <a:p>
-            <a:r>
-              <a:rPr lang="en-CA" sz="2400" dirty="0" smtClean="0"/>
-              <a:t>d</a:t>
-            </a:r>
+            <a:pPr marL="0" indent="0">
+              <a:buNone/>
+            </a:pPr>
             <a:endParaRPr lang="en-CA" sz="2400" dirty="0" smtClean="0"/>
+          </a:p>
+        </p:txBody>
+      </p:sp>
+      <p:sp>
+        <p:nvSpPr>
+          <p:cNvPr id="4" name="Rectangle 3"/>
+          <p:cNvSpPr/>
+          <p:nvPr/>
+        </p:nvSpPr>
+        <p:spPr>
+          <a:xfrm>
+            <a:off x="1181100" y="4991100"/>
+            <a:ext cx="6781800" cy="1485900"/>
+          </a:xfrm>
+          <a:prstGeom prst="rect">
+            <a:avLst/>
+          </a:prstGeom>
+        </p:spPr>
+        <p:style>
+          <a:lnRef idx="2">
+            <a:schemeClr val="accent1">
+              <a:shade val="50000"/>
+            </a:schemeClr>
+          </a:lnRef>
+          <a:fillRef idx="1">
+            <a:schemeClr val="accent1"/>
+          </a:fillRef>
+          <a:effectRef idx="0">
+            <a:schemeClr val="accent1"/>
+          </a:effectRef>
+          <a:fontRef idx="minor">
+            <a:schemeClr val="lt1"/>
+          </a:fontRef>
+        </p:style>
+        <p:txBody>
+          <a:bodyPr rtlCol="0" anchor="ctr"/>
+          <a:lstStyle/>
+          <a:p>
+            <a:pPr marL="342900" indent="-342900">
+              <a:spcAft>
+                <a:spcPts val="600"/>
+              </a:spcAft>
+              <a:buFont typeface="Arial" panose="020B0604020202020204" pitchFamily="34" charset="0"/>
+              <a:buChar char="•"/>
+            </a:pPr>
+            <a:r>
+              <a:rPr lang="en-CA" sz="2000" b="1" dirty="0" smtClean="0">
+                <a:solidFill>
+                  <a:schemeClr val="accent2"/>
+                </a:solidFill>
+              </a:rPr>
+              <a:t>The goal is to find the optimum 2D surface that minimizes the amount of squishing necessary.</a:t>
+            </a:r>
+          </a:p>
+          <a:p>
+            <a:pPr marL="342900" indent="-342900">
+              <a:buFont typeface="Arial" panose="020B0604020202020204" pitchFamily="34" charset="0"/>
+              <a:buChar char="•"/>
+            </a:pPr>
+            <a:r>
+              <a:rPr lang="en-CA" sz="2000" b="1" dirty="0" smtClean="0">
+                <a:solidFill>
+                  <a:schemeClr val="accent2"/>
+                </a:solidFill>
+              </a:rPr>
+              <a:t>Then, we squish (aka “</a:t>
+            </a:r>
+            <a:r>
+              <a:rPr lang="en-CA" sz="2000" b="1" i="1" dirty="0" smtClean="0">
+                <a:solidFill>
+                  <a:schemeClr val="accent2"/>
+                </a:solidFill>
+              </a:rPr>
+              <a:t>project”</a:t>
+            </a:r>
+            <a:r>
+              <a:rPr lang="en-CA" sz="2000" b="1" dirty="0" smtClean="0">
+                <a:solidFill>
+                  <a:schemeClr val="accent2"/>
+                </a:solidFill>
+              </a:rPr>
+              <a:t>) all data points onto this surface</a:t>
+            </a:r>
+            <a:endParaRPr lang="en-CA" sz="2000" b="1" dirty="0">
+              <a:solidFill>
+                <a:schemeClr val="accent2"/>
+              </a:solidFill>
+            </a:endParaRPr>
           </a:p>
         </p:txBody>
       </p:sp>
@@ -8027,6 +8187,10 @@
           <a:bodyPr/>
           <a:lstStyle/>
           <a:p>
+            <a:r>
+              <a:rPr lang="en-CA" dirty="0" smtClean="0"/>
+              <a:t>Technical notes </a:t>
+            </a:r>
             <a:endParaRPr lang="en-CA" dirty="0"/>
           </a:p>
         </p:txBody>
@@ -8051,7 +8215,32 @@
           <a:bodyPr/>
           <a:lstStyle/>
           <a:p>
-            <a:endParaRPr lang="en-CA" sz="2400" dirty="0" smtClean="0"/>
+            <a:pPr marL="457200" indent="-457200">
+              <a:buAutoNum type="arabicPeriod"/>
+            </a:pPr>
+            <a:r>
+              <a:rPr lang="en-CA" sz="2400" b="1" dirty="0" smtClean="0"/>
+              <a:t>Chi-squared distances: </a:t>
+            </a:r>
+          </a:p>
+          <a:p>
+            <a:pPr marL="457200" indent="-457200">
+              <a:buAutoNum type="arabicPeriod"/>
+            </a:pPr>
+            <a:r>
+              <a:rPr lang="en-CA" sz="2400" b="1" dirty="0" smtClean="0"/>
+              <a:t>Objective function</a:t>
+            </a:r>
+          </a:p>
+          <a:p>
+            <a:pPr marL="457200" indent="-457200">
+              <a:buAutoNum type="arabicPeriod"/>
+            </a:pPr>
+            <a:r>
+              <a:rPr lang="en-CA" sz="2400" b="1" dirty="0" smtClean="0"/>
+              <a:t>Symmetry of row and column analysis </a:t>
+            </a:r>
+            <a:endParaRPr lang="en-CA" sz="2400" b="1" dirty="0" smtClean="0"/>
           </a:p>
         </p:txBody>
       </p:sp>

</xml_diff>